<commit_message>
Initial creation of powerpoint file
</commit_message>
<xml_diff>
--- a/ppt/North Korean Missile testing.pptx
+++ b/ppt/North Korean Missile testing.pptx
@@ -5,11 +5,13 @@
     <p:sldMasterId id="2147483648" r:id="rId4"/>
   </p:sldMasterIdLst>
   <p:notesMasterIdLst>
-    <p:notesMasterId r:id="rId7"/>
+    <p:notesMasterId r:id="rId9"/>
   </p:notesMasterIdLst>
   <p:sldIdLst>
     <p:sldId id="256" r:id="rId5"/>
-    <p:sldId id="277" r:id="rId6"/>
+    <p:sldId id="278" r:id="rId6"/>
+    <p:sldId id="279" r:id="rId7"/>
+    <p:sldId id="280" r:id="rId8"/>
   </p:sldIdLst>
   <p:sldSz cx="12192000" cy="6858000"/>
   <p:notesSz cx="6858000" cy="9144000"/>
@@ -114,2807 +116,6 @@
     </p:ext>
   </p:extLst>
 </p:presentation>
-</file>
-
-<file path=ppt/diagrams/colors1.xml><?xml version="1.0" encoding="utf-8"?>
-<dgm:colorsDef xmlns:dgm="http://schemas.openxmlformats.org/drawingml/2006/diagram" xmlns:a="http://schemas.openxmlformats.org/drawingml/2006/main" uniqueId="urn:microsoft.com/office/officeart/2018/5/colors/Iconchunking_neutralicon_accent2_2">
-  <dgm:title val=""/>
-  <dgm:desc val=""/>
-  <dgm:catLst>
-    <dgm:cat type="accent2" pri="11200"/>
-  </dgm:catLst>
-  <dgm:styleLbl name="node0">
-    <dgm:fillClrLst meth="repeat">
-      <a:schemeClr val="accent2"/>
-    </dgm:fillClrLst>
-    <dgm:linClrLst meth="repeat">
-      <a:schemeClr val="lt1"/>
-    </dgm:linClrLst>
-    <dgm:effectClrLst/>
-    <dgm:txLinClrLst/>
-    <dgm:txFillClrLst/>
-    <dgm:txEffectClrLst/>
-  </dgm:styleLbl>
-  <dgm:styleLbl name="node1">
-    <dgm:fillClrLst meth="repeat">
-      <a:schemeClr val="bg1"/>
-    </dgm:fillClrLst>
-    <dgm:linClrLst meth="repeat">
-      <a:schemeClr val="lt1">
-        <a:alpha val="0"/>
-      </a:schemeClr>
-    </dgm:linClrLst>
-    <dgm:effectClrLst/>
-    <dgm:txLinClrLst/>
-    <dgm:txFillClrLst meth="repeat">
-      <a:schemeClr val="dk1"/>
-    </dgm:txFillClrLst>
-    <dgm:txEffectClrLst/>
-  </dgm:styleLbl>
-  <dgm:styleLbl name="alignNode1">
-    <dgm:fillClrLst meth="repeat">
-      <a:schemeClr val="accent2"/>
-    </dgm:fillClrLst>
-    <dgm:linClrLst meth="repeat">
-      <a:schemeClr val="accent2"/>
-    </dgm:linClrLst>
-    <dgm:effectClrLst/>
-    <dgm:txLinClrLst/>
-    <dgm:txFillClrLst/>
-    <dgm:txEffectClrLst/>
-  </dgm:styleLbl>
-  <dgm:styleLbl name="lnNode1">
-    <dgm:fillClrLst meth="repeat">
-      <a:schemeClr val="accent2"/>
-    </dgm:fillClrLst>
-    <dgm:linClrLst meth="repeat">
-      <a:schemeClr val="lt1"/>
-    </dgm:linClrLst>
-    <dgm:effectClrLst/>
-    <dgm:txLinClrLst/>
-    <dgm:txFillClrLst/>
-    <dgm:txEffectClrLst/>
-  </dgm:styleLbl>
-  <dgm:styleLbl name="vennNode1">
-    <dgm:fillClrLst meth="repeat">
-      <a:schemeClr val="accent2">
-        <a:alpha val="50000"/>
-      </a:schemeClr>
-    </dgm:fillClrLst>
-    <dgm:linClrLst meth="repeat">
-      <a:schemeClr val="lt1"/>
-    </dgm:linClrLst>
-    <dgm:effectClrLst/>
-    <dgm:txLinClrLst/>
-    <dgm:txFillClrLst/>
-    <dgm:txEffectClrLst/>
-  </dgm:styleLbl>
-  <dgm:styleLbl name="node2">
-    <dgm:fillClrLst meth="repeat">
-      <a:schemeClr val="accent2"/>
-    </dgm:fillClrLst>
-    <dgm:linClrLst meth="repeat">
-      <a:schemeClr val="lt1"/>
-    </dgm:linClrLst>
-    <dgm:effectClrLst/>
-    <dgm:txLinClrLst/>
-    <dgm:txFillClrLst/>
-    <dgm:txEffectClrLst/>
-  </dgm:styleLbl>
-  <dgm:styleLbl name="node3">
-    <dgm:fillClrLst meth="repeat">
-      <a:schemeClr val="accent2"/>
-    </dgm:fillClrLst>
-    <dgm:linClrLst meth="repeat">
-      <a:schemeClr val="lt1"/>
-    </dgm:linClrLst>
-    <dgm:effectClrLst/>
-    <dgm:txLinClrLst/>
-    <dgm:txFillClrLst/>
-    <dgm:txEffectClrLst/>
-  </dgm:styleLbl>
-  <dgm:styleLbl name="node4">
-    <dgm:fillClrLst meth="repeat">
-      <a:schemeClr val="accent2"/>
-    </dgm:fillClrLst>
-    <dgm:linClrLst meth="repeat">
-      <a:schemeClr val="lt1"/>
-    </dgm:linClrLst>
-    <dgm:effectClrLst/>
-    <dgm:txLinClrLst/>
-    <dgm:txFillClrLst/>
-    <dgm:txEffectClrLst/>
-  </dgm:styleLbl>
-  <dgm:styleLbl name="fgImgPlace1">
-    <dgm:fillClrLst meth="repeat">
-      <a:schemeClr val="accent2">
-        <a:tint val="50000"/>
-      </a:schemeClr>
-    </dgm:fillClrLst>
-    <dgm:linClrLst meth="repeat">
-      <a:schemeClr val="lt1"/>
-    </dgm:linClrLst>
-    <dgm:effectClrLst/>
-    <dgm:txLinClrLst/>
-    <dgm:txFillClrLst meth="repeat">
-      <a:schemeClr val="lt1"/>
-    </dgm:txFillClrLst>
-    <dgm:txEffectClrLst/>
-  </dgm:styleLbl>
-  <dgm:styleLbl name="alignImgPlace1">
-    <dgm:fillClrLst meth="repeat">
-      <a:schemeClr val="accent2">
-        <a:tint val="50000"/>
-      </a:schemeClr>
-    </dgm:fillClrLst>
-    <dgm:linClrLst meth="repeat">
-      <a:schemeClr val="lt1"/>
-    </dgm:linClrLst>
-    <dgm:effectClrLst/>
-    <dgm:txLinClrLst/>
-    <dgm:txFillClrLst meth="repeat">
-      <a:schemeClr val="lt1"/>
-    </dgm:txFillClrLst>
-    <dgm:txEffectClrLst/>
-  </dgm:styleLbl>
-  <dgm:styleLbl name="bgImgPlace1">
-    <dgm:fillClrLst meth="repeat">
-      <a:schemeClr val="accent2">
-        <a:tint val="50000"/>
-      </a:schemeClr>
-    </dgm:fillClrLst>
-    <dgm:linClrLst meth="repeat">
-      <a:schemeClr val="lt1"/>
-    </dgm:linClrLst>
-    <dgm:effectClrLst/>
-    <dgm:txLinClrLst/>
-    <dgm:txFillClrLst meth="repeat">
-      <a:schemeClr val="lt1"/>
-    </dgm:txFillClrLst>
-    <dgm:txEffectClrLst/>
-  </dgm:styleLbl>
-  <dgm:styleLbl name="sibTrans2D1">
-    <dgm:fillClrLst meth="repeat">
-      <a:schemeClr val="accent2">
-        <a:tint val="60000"/>
-      </a:schemeClr>
-    </dgm:fillClrLst>
-    <dgm:linClrLst meth="repeat">
-      <a:schemeClr val="accent2">
-        <a:tint val="60000"/>
-      </a:schemeClr>
-    </dgm:linClrLst>
-    <dgm:effectClrLst/>
-    <dgm:txLinClrLst/>
-    <dgm:txFillClrLst/>
-    <dgm:txEffectClrLst/>
-  </dgm:styleLbl>
-  <dgm:styleLbl name="fgSibTrans2D1">
-    <dgm:fillClrLst meth="repeat">
-      <a:schemeClr val="accent2">
-        <a:tint val="60000"/>
-      </a:schemeClr>
-    </dgm:fillClrLst>
-    <dgm:linClrLst meth="repeat">
-      <a:schemeClr val="accent2">
-        <a:tint val="60000"/>
-      </a:schemeClr>
-    </dgm:linClrLst>
-    <dgm:effectClrLst/>
-    <dgm:txLinClrLst/>
-    <dgm:txFillClrLst/>
-    <dgm:txEffectClrLst/>
-  </dgm:styleLbl>
-  <dgm:styleLbl name="bgSibTrans2D1">
-    <dgm:fillClrLst meth="repeat">
-      <a:schemeClr val="accent2">
-        <a:tint val="60000"/>
-      </a:schemeClr>
-    </dgm:fillClrLst>
-    <dgm:linClrLst meth="repeat">
-      <a:schemeClr val="accent2">
-        <a:tint val="60000"/>
-      </a:schemeClr>
-    </dgm:linClrLst>
-    <dgm:effectClrLst/>
-    <dgm:txLinClrLst/>
-    <dgm:txFillClrLst/>
-    <dgm:txEffectClrLst/>
-  </dgm:styleLbl>
-  <dgm:styleLbl name="sibTrans1D1">
-    <dgm:fillClrLst meth="repeat">
-      <a:schemeClr val="accent2"/>
-    </dgm:fillClrLst>
-    <dgm:linClrLst meth="repeat">
-      <a:schemeClr val="accent2"/>
-    </dgm:linClrLst>
-    <dgm:effectClrLst/>
-    <dgm:txLinClrLst/>
-    <dgm:txFillClrLst meth="repeat">
-      <a:schemeClr val="tx1"/>
-    </dgm:txFillClrLst>
-    <dgm:txEffectClrLst/>
-  </dgm:styleLbl>
-  <dgm:styleLbl name="callout">
-    <dgm:fillClrLst meth="repeat">
-      <a:schemeClr val="accent2"/>
-    </dgm:fillClrLst>
-    <dgm:linClrLst meth="repeat">
-      <a:schemeClr val="accent2">
-        <a:tint val="50000"/>
-      </a:schemeClr>
-    </dgm:linClrLst>
-    <dgm:effectClrLst/>
-    <dgm:txLinClrLst/>
-    <dgm:txFillClrLst meth="repeat">
-      <a:schemeClr val="tx1"/>
-    </dgm:txFillClrLst>
-    <dgm:txEffectClrLst/>
-  </dgm:styleLbl>
-  <dgm:styleLbl name="asst0">
-    <dgm:fillClrLst meth="repeat">
-      <a:schemeClr val="accent2"/>
-    </dgm:fillClrLst>
-    <dgm:linClrLst meth="repeat">
-      <a:schemeClr val="lt1"/>
-    </dgm:linClrLst>
-    <dgm:effectClrLst/>
-    <dgm:txLinClrLst/>
-    <dgm:txFillClrLst/>
-    <dgm:txEffectClrLst/>
-  </dgm:styleLbl>
-  <dgm:styleLbl name="asst1">
-    <dgm:fillClrLst meth="repeat">
-      <a:schemeClr val="accent2"/>
-    </dgm:fillClrLst>
-    <dgm:linClrLst meth="repeat">
-      <a:schemeClr val="lt1"/>
-    </dgm:linClrLst>
-    <dgm:effectClrLst/>
-    <dgm:txLinClrLst/>
-    <dgm:txFillClrLst/>
-    <dgm:txEffectClrLst/>
-  </dgm:styleLbl>
-  <dgm:styleLbl name="asst2">
-    <dgm:fillClrLst meth="repeat">
-      <a:schemeClr val="accent2"/>
-    </dgm:fillClrLst>
-    <dgm:linClrLst meth="repeat">
-      <a:schemeClr val="lt1"/>
-    </dgm:linClrLst>
-    <dgm:effectClrLst/>
-    <dgm:txLinClrLst/>
-    <dgm:txFillClrLst/>
-    <dgm:txEffectClrLst/>
-  </dgm:styleLbl>
-  <dgm:styleLbl name="asst3">
-    <dgm:fillClrLst meth="repeat">
-      <a:schemeClr val="accent2"/>
-    </dgm:fillClrLst>
-    <dgm:linClrLst meth="repeat">
-      <a:schemeClr val="lt1"/>
-    </dgm:linClrLst>
-    <dgm:effectClrLst/>
-    <dgm:txLinClrLst/>
-    <dgm:txFillClrLst/>
-    <dgm:txEffectClrLst/>
-  </dgm:styleLbl>
-  <dgm:styleLbl name="asst4">
-    <dgm:fillClrLst meth="repeat">
-      <a:schemeClr val="accent2"/>
-    </dgm:fillClrLst>
-    <dgm:linClrLst meth="repeat">
-      <a:schemeClr val="lt1"/>
-    </dgm:linClrLst>
-    <dgm:effectClrLst/>
-    <dgm:txLinClrLst/>
-    <dgm:txFillClrLst/>
-    <dgm:txEffectClrLst/>
-  </dgm:styleLbl>
-  <dgm:styleLbl name="parChTrans2D1">
-    <dgm:fillClrLst meth="repeat">
-      <a:schemeClr val="accent2">
-        <a:tint val="60000"/>
-      </a:schemeClr>
-    </dgm:fillClrLst>
-    <dgm:linClrLst meth="repeat">
-      <a:schemeClr val="accent2">
-        <a:tint val="60000"/>
-      </a:schemeClr>
-    </dgm:linClrLst>
-    <dgm:effectClrLst/>
-    <dgm:txLinClrLst/>
-    <dgm:txFillClrLst meth="repeat">
-      <a:schemeClr val="lt1"/>
-    </dgm:txFillClrLst>
-    <dgm:txEffectClrLst/>
-  </dgm:styleLbl>
-  <dgm:styleLbl name="parChTrans2D2">
-    <dgm:fillClrLst meth="repeat">
-      <a:schemeClr val="accent2"/>
-    </dgm:fillClrLst>
-    <dgm:linClrLst meth="repeat">
-      <a:schemeClr val="accent2"/>
-    </dgm:linClrLst>
-    <dgm:effectClrLst/>
-    <dgm:txLinClrLst/>
-    <dgm:txFillClrLst meth="repeat">
-      <a:schemeClr val="lt1"/>
-    </dgm:txFillClrLst>
-    <dgm:txEffectClrLst/>
-  </dgm:styleLbl>
-  <dgm:styleLbl name="parChTrans2D3">
-    <dgm:fillClrLst meth="repeat">
-      <a:schemeClr val="accent2"/>
-    </dgm:fillClrLst>
-    <dgm:linClrLst meth="repeat">
-      <a:schemeClr val="accent2"/>
-    </dgm:linClrLst>
-    <dgm:effectClrLst/>
-    <dgm:txLinClrLst/>
-    <dgm:txFillClrLst meth="repeat">
-      <a:schemeClr val="lt1"/>
-    </dgm:txFillClrLst>
-    <dgm:txEffectClrLst/>
-  </dgm:styleLbl>
-  <dgm:styleLbl name="parChTrans2D4">
-    <dgm:fillClrLst meth="repeat">
-      <a:schemeClr val="accent2"/>
-    </dgm:fillClrLst>
-    <dgm:linClrLst meth="repeat">
-      <a:schemeClr val="accent2"/>
-    </dgm:linClrLst>
-    <dgm:effectClrLst/>
-    <dgm:txLinClrLst/>
-    <dgm:txFillClrLst meth="repeat">
-      <a:schemeClr val="lt1"/>
-    </dgm:txFillClrLst>
-    <dgm:txEffectClrLst/>
-  </dgm:styleLbl>
-  <dgm:styleLbl name="parChTrans1D1">
-    <dgm:fillClrLst meth="repeat">
-      <a:schemeClr val="accent2"/>
-    </dgm:fillClrLst>
-    <dgm:linClrLst meth="repeat">
-      <a:schemeClr val="accent2">
-        <a:shade val="60000"/>
-      </a:schemeClr>
-    </dgm:linClrLst>
-    <dgm:effectClrLst/>
-    <dgm:txLinClrLst/>
-    <dgm:txFillClrLst meth="repeat">
-      <a:schemeClr val="tx1"/>
-    </dgm:txFillClrLst>
-    <dgm:txEffectClrLst/>
-  </dgm:styleLbl>
-  <dgm:styleLbl name="parChTrans1D2">
-    <dgm:fillClrLst meth="repeat">
-      <a:schemeClr val="accent2"/>
-    </dgm:fillClrLst>
-    <dgm:linClrLst meth="repeat">
-      <a:schemeClr val="accent2">
-        <a:shade val="60000"/>
-      </a:schemeClr>
-    </dgm:linClrLst>
-    <dgm:effectClrLst/>
-    <dgm:txLinClrLst/>
-    <dgm:txFillClrLst meth="repeat">
-      <a:schemeClr val="tx1"/>
-    </dgm:txFillClrLst>
-    <dgm:txEffectClrLst/>
-  </dgm:styleLbl>
-  <dgm:styleLbl name="parChTrans1D3">
-    <dgm:fillClrLst meth="repeat">
-      <a:schemeClr val="accent2"/>
-    </dgm:fillClrLst>
-    <dgm:linClrLst meth="repeat">
-      <a:schemeClr val="accent2">
-        <a:shade val="80000"/>
-      </a:schemeClr>
-    </dgm:linClrLst>
-    <dgm:effectClrLst/>
-    <dgm:txLinClrLst/>
-    <dgm:txFillClrLst meth="repeat">
-      <a:schemeClr val="tx1"/>
-    </dgm:txFillClrLst>
-    <dgm:txEffectClrLst/>
-  </dgm:styleLbl>
-  <dgm:styleLbl name="parChTrans1D4">
-    <dgm:fillClrLst meth="repeat">
-      <a:schemeClr val="accent2"/>
-    </dgm:fillClrLst>
-    <dgm:linClrLst meth="repeat">
-      <a:schemeClr val="accent2">
-        <a:shade val="80000"/>
-      </a:schemeClr>
-    </dgm:linClrLst>
-    <dgm:effectClrLst/>
-    <dgm:txLinClrLst/>
-    <dgm:txFillClrLst meth="repeat">
-      <a:schemeClr val="tx1"/>
-    </dgm:txFillClrLst>
-    <dgm:txEffectClrLst/>
-  </dgm:styleLbl>
-  <dgm:styleLbl name="fgAcc1">
-    <dgm:fillClrLst meth="repeat">
-      <a:schemeClr val="lt1">
-        <a:alpha val="90000"/>
-      </a:schemeClr>
-    </dgm:fillClrLst>
-    <dgm:linClrLst meth="repeat">
-      <a:schemeClr val="accent2"/>
-    </dgm:linClrLst>
-    <dgm:effectClrLst/>
-    <dgm:txLinClrLst/>
-    <dgm:txFillClrLst meth="repeat">
-      <a:schemeClr val="dk1"/>
-    </dgm:txFillClrLst>
-    <dgm:txEffectClrLst/>
-  </dgm:styleLbl>
-  <dgm:styleLbl name="conFgAcc1">
-    <dgm:fillClrLst meth="repeat">
-      <a:schemeClr val="lt1">
-        <a:alpha val="90000"/>
-      </a:schemeClr>
-    </dgm:fillClrLst>
-    <dgm:linClrLst meth="repeat">
-      <a:schemeClr val="accent2"/>
-    </dgm:linClrLst>
-    <dgm:effectClrLst/>
-    <dgm:txLinClrLst/>
-    <dgm:txFillClrLst meth="repeat">
-      <a:schemeClr val="dk1"/>
-    </dgm:txFillClrLst>
-    <dgm:txEffectClrLst/>
-  </dgm:styleLbl>
-  <dgm:styleLbl name="alignAcc1">
-    <dgm:fillClrLst meth="repeat">
-      <a:schemeClr val="lt1">
-        <a:alpha val="90000"/>
-      </a:schemeClr>
-    </dgm:fillClrLst>
-    <dgm:linClrLst meth="repeat">
-      <a:schemeClr val="accent2"/>
-    </dgm:linClrLst>
-    <dgm:effectClrLst/>
-    <dgm:txLinClrLst/>
-    <dgm:txFillClrLst meth="repeat">
-      <a:schemeClr val="dk1"/>
-    </dgm:txFillClrLst>
-    <dgm:txEffectClrLst/>
-  </dgm:styleLbl>
-  <dgm:styleLbl name="trAlignAcc1">
-    <dgm:fillClrLst meth="repeat">
-      <a:schemeClr val="lt1">
-        <a:alpha val="40000"/>
-      </a:schemeClr>
-    </dgm:fillClrLst>
-    <dgm:linClrLst meth="repeat">
-      <a:schemeClr val="accent2"/>
-    </dgm:linClrLst>
-    <dgm:effectClrLst/>
-    <dgm:txLinClrLst/>
-    <dgm:txFillClrLst meth="repeat">
-      <a:schemeClr val="dk1"/>
-    </dgm:txFillClrLst>
-    <dgm:txEffectClrLst/>
-  </dgm:styleLbl>
-  <dgm:styleLbl name="bgAcc1">
-    <dgm:fillClrLst meth="repeat">
-      <a:schemeClr val="lt1">
-        <a:alpha val="90000"/>
-      </a:schemeClr>
-    </dgm:fillClrLst>
-    <dgm:linClrLst meth="repeat">
-      <a:schemeClr val="accent2"/>
-    </dgm:linClrLst>
-    <dgm:effectClrLst/>
-    <dgm:txLinClrLst/>
-    <dgm:txFillClrLst meth="repeat">
-      <a:schemeClr val="dk1"/>
-    </dgm:txFillClrLst>
-    <dgm:txEffectClrLst/>
-  </dgm:styleLbl>
-  <dgm:styleLbl name="solidFgAcc1">
-    <dgm:fillClrLst meth="repeat">
-      <a:schemeClr val="lt1"/>
-    </dgm:fillClrLst>
-    <dgm:linClrLst meth="repeat">
-      <a:schemeClr val="accent2"/>
-    </dgm:linClrLst>
-    <dgm:effectClrLst/>
-    <dgm:txLinClrLst/>
-    <dgm:txFillClrLst meth="repeat">
-      <a:schemeClr val="dk1"/>
-    </dgm:txFillClrLst>
-    <dgm:txEffectClrLst/>
-  </dgm:styleLbl>
-  <dgm:styleLbl name="solidAlignAcc1">
-    <dgm:fillClrLst meth="repeat">
-      <a:schemeClr val="lt1"/>
-    </dgm:fillClrLst>
-    <dgm:linClrLst meth="repeat">
-      <a:schemeClr val="accent2"/>
-    </dgm:linClrLst>
-    <dgm:effectClrLst/>
-    <dgm:txLinClrLst/>
-    <dgm:txFillClrLst meth="repeat">
-      <a:schemeClr val="dk1"/>
-    </dgm:txFillClrLst>
-    <dgm:txEffectClrLst/>
-  </dgm:styleLbl>
-  <dgm:styleLbl name="solidBgAcc1">
-    <dgm:fillClrLst meth="repeat">
-      <a:schemeClr val="lt1"/>
-    </dgm:fillClrLst>
-    <dgm:linClrLst meth="repeat">
-      <a:schemeClr val="accent2"/>
-    </dgm:linClrLst>
-    <dgm:effectClrLst/>
-    <dgm:txLinClrLst/>
-    <dgm:txFillClrLst meth="repeat">
-      <a:schemeClr val="dk1"/>
-    </dgm:txFillClrLst>
-    <dgm:txEffectClrLst/>
-  </dgm:styleLbl>
-  <dgm:styleLbl name="fgAccFollowNode1">
-    <dgm:fillClrLst meth="repeat">
-      <a:schemeClr val="accent2">
-        <a:alpha val="90000"/>
-        <a:tint val="40000"/>
-      </a:schemeClr>
-    </dgm:fillClrLst>
-    <dgm:linClrLst meth="repeat">
-      <a:schemeClr val="accent2">
-        <a:alpha val="90000"/>
-        <a:tint val="40000"/>
-      </a:schemeClr>
-    </dgm:linClrLst>
-    <dgm:effectClrLst/>
-    <dgm:txLinClrLst/>
-    <dgm:txFillClrLst meth="repeat">
-      <a:schemeClr val="dk1"/>
-    </dgm:txFillClrLst>
-    <dgm:txEffectClrLst/>
-  </dgm:styleLbl>
-  <dgm:styleLbl name="alignAccFollowNode1">
-    <dgm:fillClrLst meth="repeat">
-      <a:schemeClr val="accent2">
-        <a:alpha val="90000"/>
-        <a:tint val="40000"/>
-      </a:schemeClr>
-    </dgm:fillClrLst>
-    <dgm:linClrLst meth="repeat">
-      <a:schemeClr val="accent2">
-        <a:alpha val="90000"/>
-        <a:tint val="40000"/>
-      </a:schemeClr>
-    </dgm:linClrLst>
-    <dgm:effectClrLst/>
-    <dgm:txLinClrLst/>
-    <dgm:txFillClrLst meth="repeat">
-      <a:schemeClr val="dk1"/>
-    </dgm:txFillClrLst>
-    <dgm:txEffectClrLst/>
-  </dgm:styleLbl>
-  <dgm:styleLbl name="bgAccFollowNode1">
-    <dgm:fillClrLst meth="repeat">
-      <a:schemeClr val="accent2">
-        <a:alpha val="90000"/>
-        <a:tint val="40000"/>
-      </a:schemeClr>
-    </dgm:fillClrLst>
-    <dgm:linClrLst meth="repeat">
-      <a:schemeClr val="accent2">
-        <a:alpha val="90000"/>
-        <a:tint val="40000"/>
-      </a:schemeClr>
-    </dgm:linClrLst>
-    <dgm:effectClrLst/>
-    <dgm:txLinClrLst/>
-    <dgm:txFillClrLst meth="repeat">
-      <a:schemeClr val="dk1"/>
-    </dgm:txFillClrLst>
-    <dgm:txEffectClrLst/>
-  </dgm:styleLbl>
-  <dgm:styleLbl name="fgAcc0">
-    <dgm:fillClrLst meth="repeat">
-      <a:schemeClr val="lt1">
-        <a:alpha val="90000"/>
-      </a:schemeClr>
-    </dgm:fillClrLst>
-    <dgm:linClrLst meth="repeat">
-      <a:schemeClr val="accent2"/>
-    </dgm:linClrLst>
-    <dgm:effectClrLst/>
-    <dgm:txLinClrLst/>
-    <dgm:txFillClrLst meth="repeat">
-      <a:schemeClr val="dk1"/>
-    </dgm:txFillClrLst>
-    <dgm:txEffectClrLst/>
-  </dgm:styleLbl>
-  <dgm:styleLbl name="fgAcc2">
-    <dgm:fillClrLst meth="repeat">
-      <a:schemeClr val="lt1">
-        <a:alpha val="90000"/>
-      </a:schemeClr>
-    </dgm:fillClrLst>
-    <dgm:linClrLst meth="repeat">
-      <a:schemeClr val="accent2"/>
-    </dgm:linClrLst>
-    <dgm:effectClrLst/>
-    <dgm:txLinClrLst/>
-    <dgm:txFillClrLst meth="repeat">
-      <a:schemeClr val="dk1"/>
-    </dgm:txFillClrLst>
-    <dgm:txEffectClrLst/>
-  </dgm:styleLbl>
-  <dgm:styleLbl name="fgAcc3">
-    <dgm:fillClrLst meth="repeat">
-      <a:schemeClr val="lt1">
-        <a:alpha val="90000"/>
-      </a:schemeClr>
-    </dgm:fillClrLst>
-    <dgm:linClrLst meth="repeat">
-      <a:schemeClr val="accent2"/>
-    </dgm:linClrLst>
-    <dgm:effectClrLst/>
-    <dgm:txLinClrLst/>
-    <dgm:txFillClrLst meth="repeat">
-      <a:schemeClr val="dk1"/>
-    </dgm:txFillClrLst>
-    <dgm:txEffectClrLst/>
-  </dgm:styleLbl>
-  <dgm:styleLbl name="fgAcc4">
-    <dgm:fillClrLst meth="repeat">
-      <a:schemeClr val="lt1">
-        <a:alpha val="90000"/>
-      </a:schemeClr>
-    </dgm:fillClrLst>
-    <dgm:linClrLst meth="repeat">
-      <a:schemeClr val="accent2"/>
-    </dgm:linClrLst>
-    <dgm:effectClrLst/>
-    <dgm:txLinClrLst/>
-    <dgm:txFillClrLst meth="repeat">
-      <a:schemeClr val="dk1"/>
-    </dgm:txFillClrLst>
-    <dgm:txEffectClrLst/>
-  </dgm:styleLbl>
-  <dgm:styleLbl name="bgShp">
-    <dgm:fillClrLst meth="repeat">
-      <a:schemeClr val="accent2"/>
-    </dgm:fillClrLst>
-    <dgm:linClrLst meth="repeat">
-      <a:schemeClr val="lt1">
-        <a:alpha val="0"/>
-      </a:schemeClr>
-    </dgm:linClrLst>
-    <dgm:effectClrLst/>
-    <dgm:txLinClrLst/>
-    <dgm:txFillClrLst/>
-    <dgm:txEffectClrLst/>
-  </dgm:styleLbl>
-  <dgm:styleLbl name="dkBgShp">
-    <dgm:fillClrLst meth="repeat">
-      <a:schemeClr val="accent2">
-        <a:shade val="80000"/>
-      </a:schemeClr>
-    </dgm:fillClrLst>
-    <dgm:linClrLst meth="repeat">
-      <a:schemeClr val="accent2"/>
-    </dgm:linClrLst>
-    <dgm:effectClrLst/>
-    <dgm:txLinClrLst/>
-    <dgm:txFillClrLst meth="repeat">
-      <a:schemeClr val="lt1"/>
-    </dgm:txFillClrLst>
-    <dgm:txEffectClrLst/>
-  </dgm:styleLbl>
-  <dgm:styleLbl name="trBgShp">
-    <dgm:fillClrLst meth="repeat">
-      <a:schemeClr val="accent2">
-        <a:tint val="50000"/>
-        <a:alpha val="40000"/>
-      </a:schemeClr>
-    </dgm:fillClrLst>
-    <dgm:linClrLst meth="repeat">
-      <a:schemeClr val="accent2"/>
-    </dgm:linClrLst>
-    <dgm:effectClrLst/>
-    <dgm:txLinClrLst/>
-    <dgm:txFillClrLst meth="repeat">
-      <a:schemeClr val="lt1"/>
-    </dgm:txFillClrLst>
-    <dgm:txEffectClrLst/>
-  </dgm:styleLbl>
-  <dgm:styleLbl name="fgShp">
-    <dgm:fillClrLst meth="repeat">
-      <a:schemeClr val="accent2">
-        <a:tint val="60000"/>
-      </a:schemeClr>
-    </dgm:fillClrLst>
-    <dgm:linClrLst meth="repeat">
-      <a:schemeClr val="lt1"/>
-    </dgm:linClrLst>
-    <dgm:effectClrLst/>
-    <dgm:txLinClrLst/>
-    <dgm:txFillClrLst meth="repeat">
-      <a:schemeClr val="dk1"/>
-    </dgm:txFillClrLst>
-    <dgm:txEffectClrLst/>
-  </dgm:styleLbl>
-  <dgm:styleLbl name="revTx">
-    <dgm:fillClrLst meth="repeat">
-      <a:schemeClr val="lt1">
-        <a:alpha val="0"/>
-      </a:schemeClr>
-    </dgm:fillClrLst>
-    <dgm:linClrLst meth="repeat">
-      <a:schemeClr val="dk1">
-        <a:alpha val="0"/>
-      </a:schemeClr>
-    </dgm:linClrLst>
-    <dgm:effectClrLst/>
-    <dgm:txLinClrLst/>
-    <dgm:txFillClrLst meth="repeat">
-      <a:schemeClr val="tx1"/>
-    </dgm:txFillClrLst>
-    <dgm:txEffectClrLst/>
-  </dgm:styleLbl>
-</dgm:colorsDef>
-</file>
-
-<file path=ppt/diagrams/data1.xml><?xml version="1.0" encoding="utf-8"?>
-<dgm:dataModel xmlns:dgm="http://schemas.openxmlformats.org/drawingml/2006/diagram" xmlns:a="http://schemas.openxmlformats.org/drawingml/2006/main">
-  <dgm:ptLst>
-    <dgm:pt modelId="{01A66772-F185-4D58-B8BB-E9370D7A7A2B}" type="doc">
-      <dgm:prSet loTypeId="urn:microsoft.com/office/officeart/2018/5/layout/IconCircleLabelList" loCatId="icon" qsTypeId="urn:microsoft.com/office/officeart/2005/8/quickstyle/simple1" qsCatId="simple" csTypeId="urn:microsoft.com/office/officeart/2018/5/colors/Iconchunking_neutralicon_accent2_2" csCatId="accent2" phldr="1"/>
-      <dgm:spPr/>
-      <dgm:t>
-        <a:bodyPr/>
-        <a:lstStyle/>
-        <a:p>
-          <a:endParaRPr lang="en-US"/>
-        </a:p>
-      </dgm:t>
-    </dgm:pt>
-    <dgm:pt modelId="{40FC4FFE-8987-4A26-B7F4-8A516F18ADAE}">
-      <dgm:prSet/>
-      <dgm:spPr/>
-      <dgm:t>
-        <a:bodyPr/>
-        <a:lstStyle/>
-        <a:p>
-          <a:pPr>
-            <a:lnSpc>
-              <a:spcPct val="100000"/>
-            </a:lnSpc>
-            <a:defRPr cap="all"/>
-          </a:pPr>
-          <a:r>
-            <a:rPr lang="en-US" dirty="0"/>
-            <a:t>Lorem ipsum dolor sit amet, consectetuer adipiscing elit. </a:t>
-          </a:r>
-        </a:p>
-      </dgm:t>
-    </dgm:pt>
-    <dgm:pt modelId="{CAD7EF86-FB23-41F6-BF42-040B36DEFDB1}" type="parTrans" cxnId="{C7AD8469-3C68-4AF9-AB82-79B0043AA120}">
-      <dgm:prSet/>
-      <dgm:spPr/>
-      <dgm:t>
-        <a:bodyPr/>
-        <a:lstStyle/>
-        <a:p>
-          <a:endParaRPr lang="en-US"/>
-        </a:p>
-      </dgm:t>
-    </dgm:pt>
-    <dgm:pt modelId="{5B62599A-5C9B-48E7-896E-EA782AC60C8B}" type="sibTrans" cxnId="{C7AD8469-3C68-4AF9-AB82-79B0043AA120}">
-      <dgm:prSet/>
-      <dgm:spPr/>
-      <dgm:t>
-        <a:bodyPr/>
-        <a:lstStyle/>
-        <a:p>
-          <a:endParaRPr lang="en-US"/>
-        </a:p>
-      </dgm:t>
-    </dgm:pt>
-    <dgm:pt modelId="{49225C73-1633-42F1-AB3B-7CB183E5F8B8}">
-      <dgm:prSet/>
-      <dgm:spPr/>
-      <dgm:t>
-        <a:bodyPr/>
-        <a:lstStyle/>
-        <a:p>
-          <a:pPr>
-            <a:lnSpc>
-              <a:spcPct val="100000"/>
-            </a:lnSpc>
-            <a:defRPr cap="all"/>
-          </a:pPr>
-          <a:r>
-            <a:rPr lang="en-US" dirty="0"/>
-            <a:t>Nunc viverra imperdiet enim. Fusce est. Vivamus a tellus.</a:t>
-          </a:r>
-        </a:p>
-      </dgm:t>
-    </dgm:pt>
-    <dgm:pt modelId="{1A0E2090-1D4F-438A-8766-B6030CE01ADD}" type="parTrans" cxnId="{A9154303-8225-4248-91DC-1B0156A35F07}">
-      <dgm:prSet/>
-      <dgm:spPr/>
-      <dgm:t>
-        <a:bodyPr/>
-        <a:lstStyle/>
-        <a:p>
-          <a:endParaRPr lang="en-US"/>
-        </a:p>
-      </dgm:t>
-    </dgm:pt>
-    <dgm:pt modelId="{9646853A-8964-4519-A5B1-0B7D18B2983D}" type="sibTrans" cxnId="{A9154303-8225-4248-91DC-1B0156A35F07}">
-      <dgm:prSet/>
-      <dgm:spPr/>
-      <dgm:t>
-        <a:bodyPr/>
-        <a:lstStyle/>
-        <a:p>
-          <a:endParaRPr lang="en-US"/>
-        </a:p>
-      </dgm:t>
-    </dgm:pt>
-    <dgm:pt modelId="{1C383F32-22E8-4F62-A3E0-BDC3D5F48992}">
-      <dgm:prSet/>
-      <dgm:spPr/>
-      <dgm:t>
-        <a:bodyPr/>
-        <a:lstStyle/>
-        <a:p>
-          <a:pPr>
-            <a:lnSpc>
-              <a:spcPct val="100000"/>
-            </a:lnSpc>
-            <a:defRPr cap="all"/>
-          </a:pPr>
-          <a:r>
-            <a:rPr lang="en-US" dirty="0"/>
-            <a:t>Pellentesque habitant morbi tristique senectus et netus.</a:t>
-          </a:r>
-        </a:p>
-      </dgm:t>
-    </dgm:pt>
-    <dgm:pt modelId="{A7920A2F-3244-4159-AF04-6A1D38B7B317}" type="parTrans" cxnId="{C4CCE57E-E871-46D6-BAD5-880252C95D22}">
-      <dgm:prSet/>
-      <dgm:spPr/>
-      <dgm:t>
-        <a:bodyPr/>
-        <a:lstStyle/>
-        <a:p>
-          <a:endParaRPr lang="en-US"/>
-        </a:p>
-      </dgm:t>
-    </dgm:pt>
-    <dgm:pt modelId="{8500F72A-2C6D-4FDF-9C1D-CA691380EB0B}" type="sibTrans" cxnId="{C4CCE57E-E871-46D6-BAD5-880252C95D22}">
-      <dgm:prSet/>
-      <dgm:spPr/>
-      <dgm:t>
-        <a:bodyPr/>
-        <a:lstStyle/>
-        <a:p>
-          <a:endParaRPr lang="en-US"/>
-        </a:p>
-      </dgm:t>
-    </dgm:pt>
-    <dgm:pt modelId="{50B3CE7C-E10B-4E23-BD93-03664997C932}" type="pres">
-      <dgm:prSet presAssocID="{01A66772-F185-4D58-B8BB-E9370D7A7A2B}" presName="root" presStyleCnt="0">
-        <dgm:presLayoutVars>
-          <dgm:dir/>
-          <dgm:resizeHandles val="exact"/>
-        </dgm:presLayoutVars>
-      </dgm:prSet>
-      <dgm:spPr/>
-    </dgm:pt>
-    <dgm:pt modelId="{DE9CE479-E4AE-4283-AEF1-10C1535B4324}" type="pres">
-      <dgm:prSet presAssocID="{40FC4FFE-8987-4A26-B7F4-8A516F18ADAE}" presName="compNode" presStyleCnt="0"/>
-      <dgm:spPr/>
-    </dgm:pt>
-    <dgm:pt modelId="{B59FCF02-CAD2-4D6F-9542-AD86711168CA}" type="pres">
-      <dgm:prSet presAssocID="{40FC4FFE-8987-4A26-B7F4-8A516F18ADAE}" presName="iconBgRect" presStyleLbl="bgShp" presStyleIdx="0" presStyleCnt="3"/>
-      <dgm:spPr>
-        <a:solidFill>
-          <a:schemeClr val="accent1"/>
-        </a:solidFill>
-      </dgm:spPr>
-    </dgm:pt>
-    <dgm:pt modelId="{7C175B98-93F4-4D7C-BB95-1514AB879CD5}" type="pres">
-      <dgm:prSet presAssocID="{40FC4FFE-8987-4A26-B7F4-8A516F18ADAE}" presName="iconRect" presStyleLbl="node1" presStyleIdx="0" presStyleCnt="3"/>
-      <dgm:spPr>
-        <a:blipFill>
-          <a:blip xmlns:r="http://schemas.openxmlformats.org/officeDocument/2006/relationships" r:embed="rId1">
-            <a:extLst>
-              <a:ext uri="{28A0092B-C50C-407E-A947-70E740481C1C}">
-                <a14:useLocalDpi xmlns:a14="http://schemas.microsoft.com/office/drawing/2010/main" val="0"/>
-              </a:ext>
-              <a:ext uri="{96DAC541-7B7A-43D3-8B79-37D633B846F1}">
-                <asvg:svgBlip xmlns:asvg="http://schemas.microsoft.com/office/drawing/2016/SVG/main" r:embed="rId2"/>
-              </a:ext>
-            </a:extLst>
-          </a:blip>
-          <a:srcRect/>
-          <a:stretch>
-            <a:fillRect/>
-          </a:stretch>
-        </a:blipFill>
-        <a:ln>
-          <a:noFill/>
-        </a:ln>
-      </dgm:spPr>
-      <dgm:extLst>
-        <a:ext uri="{E40237B7-FDA0-4F09-8148-C483321AD2D9}">
-          <dgm14:cNvPr xmlns:dgm14="http://schemas.microsoft.com/office/drawing/2010/diagram" id="0" name="" descr="Bar graph with downward trend"/>
-        </a:ext>
-      </dgm:extLst>
-    </dgm:pt>
-    <dgm:pt modelId="{677A3090-5F01-43FD-9FA6-C0420AD80FD6}" type="pres">
-      <dgm:prSet presAssocID="{40FC4FFE-8987-4A26-B7F4-8A516F18ADAE}" presName="spaceRect" presStyleCnt="0"/>
-      <dgm:spPr/>
-    </dgm:pt>
-    <dgm:pt modelId="{127117FB-F8A7-4A20-A8A7-EC686DDC76D0}" type="pres">
-      <dgm:prSet presAssocID="{40FC4FFE-8987-4A26-B7F4-8A516F18ADAE}" presName="textRect" presStyleLbl="revTx" presStyleIdx="0" presStyleCnt="3">
-        <dgm:presLayoutVars>
-          <dgm:chMax val="1"/>
-          <dgm:chPref val="1"/>
-        </dgm:presLayoutVars>
-      </dgm:prSet>
-      <dgm:spPr/>
-    </dgm:pt>
-    <dgm:pt modelId="{FD1EED9C-83D3-41AD-A09B-D3B36354168F}" type="pres">
-      <dgm:prSet presAssocID="{5B62599A-5C9B-48E7-896E-EA782AC60C8B}" presName="sibTrans" presStyleCnt="0"/>
-      <dgm:spPr/>
-    </dgm:pt>
-    <dgm:pt modelId="{C998AB0A-577D-44AA-A068-F634DDE7BD47}" type="pres">
-      <dgm:prSet presAssocID="{49225C73-1633-42F1-AB3B-7CB183E5F8B8}" presName="compNode" presStyleCnt="0"/>
-      <dgm:spPr/>
-    </dgm:pt>
-    <dgm:pt modelId="{BCD8CDD9-0C56-4401-ADB1-8B48DAB2C96F}" type="pres">
-      <dgm:prSet presAssocID="{49225C73-1633-42F1-AB3B-7CB183E5F8B8}" presName="iconBgRect" presStyleLbl="bgShp" presStyleIdx="1" presStyleCnt="3"/>
-      <dgm:spPr>
-        <a:solidFill>
-          <a:schemeClr val="accent1"/>
-        </a:solidFill>
-      </dgm:spPr>
-    </dgm:pt>
-    <dgm:pt modelId="{DB4CA7C4-FCA1-4127-B20A-2A5C031A3CF4}" type="pres">
-      <dgm:prSet presAssocID="{49225C73-1633-42F1-AB3B-7CB183E5F8B8}" presName="iconRect" presStyleLbl="node1" presStyleIdx="1" presStyleCnt="3"/>
-      <dgm:spPr>
-        <a:blipFill>
-          <a:blip xmlns:r="http://schemas.openxmlformats.org/officeDocument/2006/relationships" r:embed="rId3">
-            <a:extLst>
-              <a:ext uri="{28A0092B-C50C-407E-A947-70E740481C1C}">
-                <a14:useLocalDpi xmlns:a14="http://schemas.microsoft.com/office/drawing/2010/main" val="0"/>
-              </a:ext>
-              <a:ext uri="{96DAC541-7B7A-43D3-8B79-37D633B846F1}">
-                <asvg:svgBlip xmlns:asvg="http://schemas.microsoft.com/office/drawing/2016/SVG/main" r:embed="rId4"/>
-              </a:ext>
-            </a:extLst>
-          </a:blip>
-          <a:srcRect/>
-          <a:stretch>
-            <a:fillRect/>
-          </a:stretch>
-        </a:blipFill>
-        <a:ln>
-          <a:noFill/>
-        </a:ln>
-      </dgm:spPr>
-      <dgm:extLst>
-        <a:ext uri="{E40237B7-FDA0-4F09-8148-C483321AD2D9}">
-          <dgm14:cNvPr xmlns:dgm14="http://schemas.microsoft.com/office/drawing/2010/diagram" id="0" name="" descr="Presentation with bar chart"/>
-        </a:ext>
-      </dgm:extLst>
-    </dgm:pt>
-    <dgm:pt modelId="{9B0C8FBF-0BDD-48A5-967E-F3FE71659F6A}" type="pres">
-      <dgm:prSet presAssocID="{49225C73-1633-42F1-AB3B-7CB183E5F8B8}" presName="spaceRect" presStyleCnt="0"/>
-      <dgm:spPr/>
-    </dgm:pt>
-    <dgm:pt modelId="{7E6FE37A-5DB0-4899-9FCB-0CE39BC185F8}" type="pres">
-      <dgm:prSet presAssocID="{49225C73-1633-42F1-AB3B-7CB183E5F8B8}" presName="textRect" presStyleLbl="revTx" presStyleIdx="1" presStyleCnt="3">
-        <dgm:presLayoutVars>
-          <dgm:chMax val="1"/>
-          <dgm:chPref val="1"/>
-        </dgm:presLayoutVars>
-      </dgm:prSet>
-      <dgm:spPr/>
-    </dgm:pt>
-    <dgm:pt modelId="{5A266296-0042-402F-92EF-D59AB148E92E}" type="pres">
-      <dgm:prSet presAssocID="{9646853A-8964-4519-A5B1-0B7D18B2983D}" presName="sibTrans" presStyleCnt="0"/>
-      <dgm:spPr/>
-    </dgm:pt>
-    <dgm:pt modelId="{ECFA770B-DE2C-4683-A038-58D0FE44BC27}" type="pres">
-      <dgm:prSet presAssocID="{1C383F32-22E8-4F62-A3E0-BDC3D5F48992}" presName="compNode" presStyleCnt="0"/>
-      <dgm:spPr/>
-    </dgm:pt>
-    <dgm:pt modelId="{FF93E135-77D6-48A0-8871-9BC93D705D06}" type="pres">
-      <dgm:prSet presAssocID="{1C383F32-22E8-4F62-A3E0-BDC3D5F48992}" presName="iconBgRect" presStyleLbl="bgShp" presStyleIdx="2" presStyleCnt="3"/>
-      <dgm:spPr>
-        <a:solidFill>
-          <a:schemeClr val="accent1"/>
-        </a:solidFill>
-      </dgm:spPr>
-    </dgm:pt>
-    <dgm:pt modelId="{39509775-983E-4110-B989-EE2CD6514BE0}" type="pres">
-      <dgm:prSet presAssocID="{1C383F32-22E8-4F62-A3E0-BDC3D5F48992}" presName="iconRect" presStyleLbl="node1" presStyleIdx="2" presStyleCnt="3"/>
-      <dgm:spPr>
-        <a:blipFill>
-          <a:blip xmlns:r="http://schemas.openxmlformats.org/officeDocument/2006/relationships" r:embed="rId5">
-            <a:extLst>
-              <a:ext uri="{28A0092B-C50C-407E-A947-70E740481C1C}">
-                <a14:useLocalDpi xmlns:a14="http://schemas.microsoft.com/office/drawing/2010/main" val="0"/>
-              </a:ext>
-              <a:ext uri="{96DAC541-7B7A-43D3-8B79-37D633B846F1}">
-                <asvg:svgBlip xmlns:asvg="http://schemas.microsoft.com/office/drawing/2016/SVG/main" r:embed="rId6"/>
-              </a:ext>
-            </a:extLst>
-          </a:blip>
-          <a:srcRect/>
-          <a:stretch>
-            <a:fillRect/>
-          </a:stretch>
-        </a:blipFill>
-        <a:ln>
-          <a:noFill/>
-        </a:ln>
-      </dgm:spPr>
-      <dgm:extLst>
-        <a:ext uri="{E40237B7-FDA0-4F09-8148-C483321AD2D9}">
-          <dgm14:cNvPr xmlns:dgm14="http://schemas.microsoft.com/office/drawing/2010/diagram" id="0" name="" descr="Stopwatch"/>
-        </a:ext>
-      </dgm:extLst>
-    </dgm:pt>
-    <dgm:pt modelId="{493B43B2-705C-4AE5-8A77-D8DEEDA1B5CF}" type="pres">
-      <dgm:prSet presAssocID="{1C383F32-22E8-4F62-A3E0-BDC3D5F48992}" presName="spaceRect" presStyleCnt="0"/>
-      <dgm:spPr/>
-    </dgm:pt>
-    <dgm:pt modelId="{1AEDC777-00B3-41D7-9AE1-23D741E941C3}" type="pres">
-      <dgm:prSet presAssocID="{1C383F32-22E8-4F62-A3E0-BDC3D5F48992}" presName="textRect" presStyleLbl="revTx" presStyleIdx="2" presStyleCnt="3">
-        <dgm:presLayoutVars>
-          <dgm:chMax val="1"/>
-          <dgm:chPref val="1"/>
-        </dgm:presLayoutVars>
-      </dgm:prSet>
-      <dgm:spPr/>
-    </dgm:pt>
-  </dgm:ptLst>
-  <dgm:cxnLst>
-    <dgm:cxn modelId="{A9154303-8225-4248-91DC-1B0156A35F07}" srcId="{01A66772-F185-4D58-B8BB-E9370D7A7A2B}" destId="{49225C73-1633-42F1-AB3B-7CB183E5F8B8}" srcOrd="1" destOrd="0" parTransId="{1A0E2090-1D4F-438A-8766-B6030CE01ADD}" sibTransId="{9646853A-8964-4519-A5B1-0B7D18B2983D}"/>
-    <dgm:cxn modelId="{7A710F69-5154-4855-ACF5-BC7C1BF85A80}" type="presOf" srcId="{49225C73-1633-42F1-AB3B-7CB183E5F8B8}" destId="{7E6FE37A-5DB0-4899-9FCB-0CE39BC185F8}" srcOrd="0" destOrd="0" presId="urn:microsoft.com/office/officeart/2018/5/layout/IconCircleLabelList"/>
-    <dgm:cxn modelId="{C7AD8469-3C68-4AF9-AB82-79B0043AA120}" srcId="{01A66772-F185-4D58-B8BB-E9370D7A7A2B}" destId="{40FC4FFE-8987-4A26-B7F4-8A516F18ADAE}" srcOrd="0" destOrd="0" parTransId="{CAD7EF86-FB23-41F6-BF42-040B36DEFDB1}" sibTransId="{5B62599A-5C9B-48E7-896E-EA782AC60C8B}"/>
-    <dgm:cxn modelId="{676D3A6A-6EA7-4483-BB12-0BD4A7D7AF9D}" type="presOf" srcId="{01A66772-F185-4D58-B8BB-E9370D7A7A2B}" destId="{50B3CE7C-E10B-4E23-BD93-03664997C932}" srcOrd="0" destOrd="0" presId="urn:microsoft.com/office/officeart/2018/5/layout/IconCircleLabelList"/>
-    <dgm:cxn modelId="{1496FC70-DB8B-48D4-98DE-DD2856E389EE}" type="presOf" srcId="{1C383F32-22E8-4F62-A3E0-BDC3D5F48992}" destId="{1AEDC777-00B3-41D7-9AE1-23D741E941C3}" srcOrd="0" destOrd="0" presId="urn:microsoft.com/office/officeart/2018/5/layout/IconCircleLabelList"/>
-    <dgm:cxn modelId="{C4CCE57E-E871-46D6-BAD5-880252C95D22}" srcId="{01A66772-F185-4D58-B8BB-E9370D7A7A2B}" destId="{1C383F32-22E8-4F62-A3E0-BDC3D5F48992}" srcOrd="2" destOrd="0" parTransId="{A7920A2F-3244-4159-AF04-6A1D38B7B317}" sibTransId="{8500F72A-2C6D-4FDF-9C1D-CA691380EB0B}"/>
-    <dgm:cxn modelId="{355227E3-55E0-4343-BC8D-FC0EB1694F48}" type="presOf" srcId="{40FC4FFE-8987-4A26-B7F4-8A516F18ADAE}" destId="{127117FB-F8A7-4A20-A8A7-EC686DDC76D0}" srcOrd="0" destOrd="0" presId="urn:microsoft.com/office/officeart/2018/5/layout/IconCircleLabelList"/>
-    <dgm:cxn modelId="{555498CB-3ED1-404E-A25F-EB243EFC5FB1}" type="presParOf" srcId="{50B3CE7C-E10B-4E23-BD93-03664997C932}" destId="{DE9CE479-E4AE-4283-AEF1-10C1535B4324}" srcOrd="0" destOrd="0" presId="urn:microsoft.com/office/officeart/2018/5/layout/IconCircleLabelList"/>
-    <dgm:cxn modelId="{11F12D49-CD08-4D50-BD13-3ECBC3A476A4}" type="presParOf" srcId="{DE9CE479-E4AE-4283-AEF1-10C1535B4324}" destId="{B59FCF02-CAD2-4D6F-9542-AD86711168CA}" srcOrd="0" destOrd="0" presId="urn:microsoft.com/office/officeart/2018/5/layout/IconCircleLabelList"/>
-    <dgm:cxn modelId="{F443A659-540B-487B-97F9-49219CF60D6B}" type="presParOf" srcId="{DE9CE479-E4AE-4283-AEF1-10C1535B4324}" destId="{7C175B98-93F4-4D7C-BB95-1514AB879CD5}" srcOrd="1" destOrd="0" presId="urn:microsoft.com/office/officeart/2018/5/layout/IconCircleLabelList"/>
-    <dgm:cxn modelId="{A503D7AB-7D64-4163-93B5-1CEEDAE81823}" type="presParOf" srcId="{DE9CE479-E4AE-4283-AEF1-10C1535B4324}" destId="{677A3090-5F01-43FD-9FA6-C0420AD80FD6}" srcOrd="2" destOrd="0" presId="urn:microsoft.com/office/officeart/2018/5/layout/IconCircleLabelList"/>
-    <dgm:cxn modelId="{780188ED-7DCE-45BB-B6AF-91BE48969612}" type="presParOf" srcId="{DE9CE479-E4AE-4283-AEF1-10C1535B4324}" destId="{127117FB-F8A7-4A20-A8A7-EC686DDC76D0}" srcOrd="3" destOrd="0" presId="urn:microsoft.com/office/officeart/2018/5/layout/IconCircleLabelList"/>
-    <dgm:cxn modelId="{155719F8-A89B-4E96-BC49-C48BC717F480}" type="presParOf" srcId="{50B3CE7C-E10B-4E23-BD93-03664997C932}" destId="{FD1EED9C-83D3-41AD-A09B-D3B36354168F}" srcOrd="1" destOrd="0" presId="urn:microsoft.com/office/officeart/2018/5/layout/IconCircleLabelList"/>
-    <dgm:cxn modelId="{2772E199-56B0-4310-A55E-67D00CA3E59E}" type="presParOf" srcId="{50B3CE7C-E10B-4E23-BD93-03664997C932}" destId="{C998AB0A-577D-44AA-A068-F634DDE7BD47}" srcOrd="2" destOrd="0" presId="urn:microsoft.com/office/officeart/2018/5/layout/IconCircleLabelList"/>
-    <dgm:cxn modelId="{4E351D18-D97F-4B92-A608-2E9600B91C28}" type="presParOf" srcId="{C998AB0A-577D-44AA-A068-F634DDE7BD47}" destId="{BCD8CDD9-0C56-4401-ADB1-8B48DAB2C96F}" srcOrd="0" destOrd="0" presId="urn:microsoft.com/office/officeart/2018/5/layout/IconCircleLabelList"/>
-    <dgm:cxn modelId="{B3DC724C-4569-4E9D-BD5A-49E4CD991FD0}" type="presParOf" srcId="{C998AB0A-577D-44AA-A068-F634DDE7BD47}" destId="{DB4CA7C4-FCA1-4127-B20A-2A5C031A3CF4}" srcOrd="1" destOrd="0" presId="urn:microsoft.com/office/officeart/2018/5/layout/IconCircleLabelList"/>
-    <dgm:cxn modelId="{AD1AB552-CCE0-4911-BB9E-5D4A60B21F4F}" type="presParOf" srcId="{C998AB0A-577D-44AA-A068-F634DDE7BD47}" destId="{9B0C8FBF-0BDD-48A5-967E-F3FE71659F6A}" srcOrd="2" destOrd="0" presId="urn:microsoft.com/office/officeart/2018/5/layout/IconCircleLabelList"/>
-    <dgm:cxn modelId="{8558F796-2D01-40FE-A21A-7530EEBC3BC3}" type="presParOf" srcId="{C998AB0A-577D-44AA-A068-F634DDE7BD47}" destId="{7E6FE37A-5DB0-4899-9FCB-0CE39BC185F8}" srcOrd="3" destOrd="0" presId="urn:microsoft.com/office/officeart/2018/5/layout/IconCircleLabelList"/>
-    <dgm:cxn modelId="{1532E2BE-82E9-40A4-A6F7-40B60FC879AE}" type="presParOf" srcId="{50B3CE7C-E10B-4E23-BD93-03664997C932}" destId="{5A266296-0042-402F-92EF-D59AB148E92E}" srcOrd="3" destOrd="0" presId="urn:microsoft.com/office/officeart/2018/5/layout/IconCircleLabelList"/>
-    <dgm:cxn modelId="{3A7F4DB9-1469-4F58-B633-24B7EEE084D1}" type="presParOf" srcId="{50B3CE7C-E10B-4E23-BD93-03664997C932}" destId="{ECFA770B-DE2C-4683-A038-58D0FE44BC27}" srcOrd="4" destOrd="0" presId="urn:microsoft.com/office/officeart/2018/5/layout/IconCircleLabelList"/>
-    <dgm:cxn modelId="{91311827-CDAC-4BA8-B4A3-117AFD1CEE2D}" type="presParOf" srcId="{ECFA770B-DE2C-4683-A038-58D0FE44BC27}" destId="{FF93E135-77D6-48A0-8871-9BC93D705D06}" srcOrd="0" destOrd="0" presId="urn:microsoft.com/office/officeart/2018/5/layout/IconCircleLabelList"/>
-    <dgm:cxn modelId="{83B7CA40-11B7-4507-8422-A40F02D469B2}" type="presParOf" srcId="{ECFA770B-DE2C-4683-A038-58D0FE44BC27}" destId="{39509775-983E-4110-B989-EE2CD6514BE0}" srcOrd="1" destOrd="0" presId="urn:microsoft.com/office/officeart/2018/5/layout/IconCircleLabelList"/>
-    <dgm:cxn modelId="{A44BB251-01EB-4DEF-A28C-6D495183E4DC}" type="presParOf" srcId="{ECFA770B-DE2C-4683-A038-58D0FE44BC27}" destId="{493B43B2-705C-4AE5-8A77-D8DEEDA1B5CF}" srcOrd="2" destOrd="0" presId="urn:microsoft.com/office/officeart/2018/5/layout/IconCircleLabelList"/>
-    <dgm:cxn modelId="{1EFA52DF-3C80-4DAA-BED6-AFE2F81796B2}" type="presParOf" srcId="{ECFA770B-DE2C-4683-A038-58D0FE44BC27}" destId="{1AEDC777-00B3-41D7-9AE1-23D741E941C3}" srcOrd="3" destOrd="0" presId="urn:microsoft.com/office/officeart/2018/5/layout/IconCircleLabelList"/>
-  </dgm:cxnLst>
-  <dgm:bg/>
-  <dgm:whole/>
-  <dgm:extLst>
-    <a:ext uri="http://schemas.microsoft.com/office/drawing/2008/diagram">
-      <dsp:dataModelExt xmlns:dsp="http://schemas.microsoft.com/office/drawing/2008/diagram" relId="rId6" minVer="http://schemas.openxmlformats.org/drawingml/2006/diagram"/>
-    </a:ext>
-  </dgm:extLst>
-</dgm:dataModel>
-</file>
-
-<file path=ppt/diagrams/drawing1.xml><?xml version="1.0" encoding="utf-8"?>
-<dsp:drawing xmlns:dgm="http://schemas.openxmlformats.org/drawingml/2006/diagram" xmlns:dsp="http://schemas.microsoft.com/office/drawing/2008/diagram" xmlns:a="http://schemas.openxmlformats.org/drawingml/2006/main">
-  <dsp:spTree>
-    <dsp:nvGrpSpPr>
-      <dsp:cNvPr id="0" name=""/>
-      <dsp:cNvGrpSpPr/>
-    </dsp:nvGrpSpPr>
-    <dsp:grpSpPr/>
-    <dsp:sp modelId="{B59FCF02-CAD2-4D6F-9542-AD86711168CA}">
-      <dsp:nvSpPr>
-        <dsp:cNvPr id="0" name=""/>
-        <dsp:cNvSpPr/>
-      </dsp:nvSpPr>
-      <dsp:spPr>
-        <a:xfrm>
-          <a:off x="614381" y="503862"/>
-          <a:ext cx="1749937" cy="1749937"/>
-        </a:xfrm>
-        <a:prstGeom prst="ellipse">
-          <a:avLst/>
-        </a:prstGeom>
-        <a:solidFill>
-          <a:schemeClr val="accent1"/>
-        </a:solidFill>
-        <a:ln>
-          <a:noFill/>
-        </a:ln>
-        <a:effectLst/>
-      </dsp:spPr>
-      <dsp:style>
-        <a:lnRef idx="0">
-          <a:scrgbClr r="0" g="0" b="0"/>
-        </a:lnRef>
-        <a:fillRef idx="1">
-          <a:scrgbClr r="0" g="0" b="0"/>
-        </a:fillRef>
-        <a:effectRef idx="0">
-          <a:scrgbClr r="0" g="0" b="0"/>
-        </a:effectRef>
-        <a:fontRef idx="minor"/>
-      </dsp:style>
-    </dsp:sp>
-    <dsp:sp modelId="{7C175B98-93F4-4D7C-BB95-1514AB879CD5}">
-      <dsp:nvSpPr>
-        <dsp:cNvPr id="0" name=""/>
-        <dsp:cNvSpPr/>
-      </dsp:nvSpPr>
-      <dsp:spPr>
-        <a:xfrm>
-          <a:off x="987318" y="876800"/>
-          <a:ext cx="1004062" cy="1004062"/>
-        </a:xfrm>
-        <a:prstGeom prst="rect">
-          <a:avLst/>
-        </a:prstGeom>
-        <a:blipFill>
-          <a:blip xmlns:r="http://schemas.openxmlformats.org/officeDocument/2006/relationships" r:embed="rId1">
-            <a:extLst>
-              <a:ext uri="{28A0092B-C50C-407E-A947-70E740481C1C}">
-                <a14:useLocalDpi xmlns:a14="http://schemas.microsoft.com/office/drawing/2010/main" val="0"/>
-              </a:ext>
-              <a:ext uri="{96DAC541-7B7A-43D3-8B79-37D633B846F1}">
-                <asvg:svgBlip xmlns:asvg="http://schemas.microsoft.com/office/drawing/2016/SVG/main" r:embed="rId2"/>
-              </a:ext>
-            </a:extLst>
-          </a:blip>
-          <a:srcRect/>
-          <a:stretch>
-            <a:fillRect/>
-          </a:stretch>
-        </a:blipFill>
-        <a:ln w="15875" cap="flat" cmpd="sng" algn="ctr">
-          <a:noFill/>
-          <a:prstDash val="solid"/>
-        </a:ln>
-        <a:effectLst/>
-      </dsp:spPr>
-      <dsp:style>
-        <a:lnRef idx="2">
-          <a:scrgbClr r="0" g="0" b="0"/>
-        </a:lnRef>
-        <a:fillRef idx="1">
-          <a:scrgbClr r="0" g="0" b="0"/>
-        </a:fillRef>
-        <a:effectRef idx="0">
-          <a:scrgbClr r="0" g="0" b="0"/>
-        </a:effectRef>
-        <a:fontRef idx="minor">
-          <a:schemeClr val="lt1"/>
-        </a:fontRef>
-      </dsp:style>
-    </dsp:sp>
-    <dsp:sp modelId="{127117FB-F8A7-4A20-A8A7-EC686DDC76D0}">
-      <dsp:nvSpPr>
-        <dsp:cNvPr id="0" name=""/>
-        <dsp:cNvSpPr/>
-      </dsp:nvSpPr>
-      <dsp:spPr>
-        <a:xfrm>
-          <a:off x="54974" y="2798862"/>
-          <a:ext cx="2868750" cy="720000"/>
-        </a:xfrm>
-        <a:prstGeom prst="rect">
-          <a:avLst/>
-        </a:prstGeom>
-        <a:noFill/>
-        <a:ln>
-          <a:noFill/>
-        </a:ln>
-        <a:effectLst/>
-      </dsp:spPr>
-      <dsp:style>
-        <a:lnRef idx="0">
-          <a:scrgbClr r="0" g="0" b="0"/>
-        </a:lnRef>
-        <a:fillRef idx="0">
-          <a:scrgbClr r="0" g="0" b="0"/>
-        </a:fillRef>
-        <a:effectRef idx="0">
-          <a:scrgbClr r="0" g="0" b="0"/>
-        </a:effectRef>
-        <a:fontRef idx="minor"/>
-      </dsp:style>
-      <dsp:txBody>
-        <a:bodyPr spcFirstLastPara="0" vert="horz" wrap="square" lIns="0" tIns="0" rIns="0" bIns="0" numCol="1" spcCol="1270" anchor="t" anchorCtr="0">
-          <a:noAutofit/>
-        </a:bodyPr>
-        <a:lstStyle/>
-        <a:p>
-          <a:pPr marL="0" lvl="0" indent="0" algn="ctr" defTabSz="755650">
-            <a:lnSpc>
-              <a:spcPct val="100000"/>
-            </a:lnSpc>
-            <a:spcBef>
-              <a:spcPct val="0"/>
-            </a:spcBef>
-            <a:spcAft>
-              <a:spcPct val="35000"/>
-            </a:spcAft>
-            <a:buNone/>
-            <a:defRPr cap="all"/>
-          </a:pPr>
-          <a:r>
-            <a:rPr lang="en-US" sz="1700" kern="1200" dirty="0"/>
-            <a:t>Lorem ipsum dolor sit amet, consectetuer adipiscing elit. </a:t>
-          </a:r>
-        </a:p>
-      </dsp:txBody>
-      <dsp:txXfrm>
-        <a:off x="54974" y="2798862"/>
-        <a:ext cx="2868750" cy="720000"/>
-      </dsp:txXfrm>
-    </dsp:sp>
-    <dsp:sp modelId="{BCD8CDD9-0C56-4401-ADB1-8B48DAB2C96F}">
-      <dsp:nvSpPr>
-        <dsp:cNvPr id="0" name=""/>
-        <dsp:cNvSpPr/>
-      </dsp:nvSpPr>
-      <dsp:spPr>
-        <a:xfrm>
-          <a:off x="3985162" y="503862"/>
-          <a:ext cx="1749937" cy="1749937"/>
-        </a:xfrm>
-        <a:prstGeom prst="ellipse">
-          <a:avLst/>
-        </a:prstGeom>
-        <a:solidFill>
-          <a:schemeClr val="accent1"/>
-        </a:solidFill>
-        <a:ln>
-          <a:noFill/>
-        </a:ln>
-        <a:effectLst/>
-      </dsp:spPr>
-      <dsp:style>
-        <a:lnRef idx="0">
-          <a:scrgbClr r="0" g="0" b="0"/>
-        </a:lnRef>
-        <a:fillRef idx="1">
-          <a:scrgbClr r="0" g="0" b="0"/>
-        </a:fillRef>
-        <a:effectRef idx="0">
-          <a:scrgbClr r="0" g="0" b="0"/>
-        </a:effectRef>
-        <a:fontRef idx="minor"/>
-      </dsp:style>
-    </dsp:sp>
-    <dsp:sp modelId="{DB4CA7C4-FCA1-4127-B20A-2A5C031A3CF4}">
-      <dsp:nvSpPr>
-        <dsp:cNvPr id="0" name=""/>
-        <dsp:cNvSpPr/>
-      </dsp:nvSpPr>
-      <dsp:spPr>
-        <a:xfrm>
-          <a:off x="4358099" y="876800"/>
-          <a:ext cx="1004062" cy="1004062"/>
-        </a:xfrm>
-        <a:prstGeom prst="rect">
-          <a:avLst/>
-        </a:prstGeom>
-        <a:blipFill>
-          <a:blip xmlns:r="http://schemas.openxmlformats.org/officeDocument/2006/relationships" r:embed="rId3">
-            <a:extLst>
-              <a:ext uri="{28A0092B-C50C-407E-A947-70E740481C1C}">
-                <a14:useLocalDpi xmlns:a14="http://schemas.microsoft.com/office/drawing/2010/main" val="0"/>
-              </a:ext>
-              <a:ext uri="{96DAC541-7B7A-43D3-8B79-37D633B846F1}">
-                <asvg:svgBlip xmlns:asvg="http://schemas.microsoft.com/office/drawing/2016/SVG/main" r:embed="rId4"/>
-              </a:ext>
-            </a:extLst>
-          </a:blip>
-          <a:srcRect/>
-          <a:stretch>
-            <a:fillRect/>
-          </a:stretch>
-        </a:blipFill>
-        <a:ln w="15875" cap="flat" cmpd="sng" algn="ctr">
-          <a:noFill/>
-          <a:prstDash val="solid"/>
-        </a:ln>
-        <a:effectLst/>
-      </dsp:spPr>
-      <dsp:style>
-        <a:lnRef idx="2">
-          <a:scrgbClr r="0" g="0" b="0"/>
-        </a:lnRef>
-        <a:fillRef idx="1">
-          <a:scrgbClr r="0" g="0" b="0"/>
-        </a:fillRef>
-        <a:effectRef idx="0">
-          <a:scrgbClr r="0" g="0" b="0"/>
-        </a:effectRef>
-        <a:fontRef idx="minor">
-          <a:schemeClr val="lt1"/>
-        </a:fontRef>
-      </dsp:style>
-    </dsp:sp>
-    <dsp:sp modelId="{7E6FE37A-5DB0-4899-9FCB-0CE39BC185F8}">
-      <dsp:nvSpPr>
-        <dsp:cNvPr id="0" name=""/>
-        <dsp:cNvSpPr/>
-      </dsp:nvSpPr>
-      <dsp:spPr>
-        <a:xfrm>
-          <a:off x="3425756" y="2798862"/>
-          <a:ext cx="2868750" cy="720000"/>
-        </a:xfrm>
-        <a:prstGeom prst="rect">
-          <a:avLst/>
-        </a:prstGeom>
-        <a:noFill/>
-        <a:ln>
-          <a:noFill/>
-        </a:ln>
-        <a:effectLst/>
-      </dsp:spPr>
-      <dsp:style>
-        <a:lnRef idx="0">
-          <a:scrgbClr r="0" g="0" b="0"/>
-        </a:lnRef>
-        <a:fillRef idx="0">
-          <a:scrgbClr r="0" g="0" b="0"/>
-        </a:fillRef>
-        <a:effectRef idx="0">
-          <a:scrgbClr r="0" g="0" b="0"/>
-        </a:effectRef>
-        <a:fontRef idx="minor"/>
-      </dsp:style>
-      <dsp:txBody>
-        <a:bodyPr spcFirstLastPara="0" vert="horz" wrap="square" lIns="0" tIns="0" rIns="0" bIns="0" numCol="1" spcCol="1270" anchor="t" anchorCtr="0">
-          <a:noAutofit/>
-        </a:bodyPr>
-        <a:lstStyle/>
-        <a:p>
-          <a:pPr marL="0" lvl="0" indent="0" algn="ctr" defTabSz="755650">
-            <a:lnSpc>
-              <a:spcPct val="100000"/>
-            </a:lnSpc>
-            <a:spcBef>
-              <a:spcPct val="0"/>
-            </a:spcBef>
-            <a:spcAft>
-              <a:spcPct val="35000"/>
-            </a:spcAft>
-            <a:buNone/>
-            <a:defRPr cap="all"/>
-          </a:pPr>
-          <a:r>
-            <a:rPr lang="en-US" sz="1700" kern="1200" dirty="0"/>
-            <a:t>Nunc viverra imperdiet enim. Fusce est. Vivamus a tellus.</a:t>
-          </a:r>
-        </a:p>
-      </dsp:txBody>
-      <dsp:txXfrm>
-        <a:off x="3425756" y="2798862"/>
-        <a:ext cx="2868750" cy="720000"/>
-      </dsp:txXfrm>
-    </dsp:sp>
-    <dsp:sp modelId="{FF93E135-77D6-48A0-8871-9BC93D705D06}">
-      <dsp:nvSpPr>
-        <dsp:cNvPr id="0" name=""/>
-        <dsp:cNvSpPr/>
-      </dsp:nvSpPr>
-      <dsp:spPr>
-        <a:xfrm>
-          <a:off x="7355943" y="503862"/>
-          <a:ext cx="1749937" cy="1749937"/>
-        </a:xfrm>
-        <a:prstGeom prst="ellipse">
-          <a:avLst/>
-        </a:prstGeom>
-        <a:solidFill>
-          <a:schemeClr val="accent1"/>
-        </a:solidFill>
-        <a:ln>
-          <a:noFill/>
-        </a:ln>
-        <a:effectLst/>
-      </dsp:spPr>
-      <dsp:style>
-        <a:lnRef idx="0">
-          <a:scrgbClr r="0" g="0" b="0"/>
-        </a:lnRef>
-        <a:fillRef idx="1">
-          <a:scrgbClr r="0" g="0" b="0"/>
-        </a:fillRef>
-        <a:effectRef idx="0">
-          <a:scrgbClr r="0" g="0" b="0"/>
-        </a:effectRef>
-        <a:fontRef idx="minor"/>
-      </dsp:style>
-    </dsp:sp>
-    <dsp:sp modelId="{39509775-983E-4110-B989-EE2CD6514BE0}">
-      <dsp:nvSpPr>
-        <dsp:cNvPr id="0" name=""/>
-        <dsp:cNvSpPr/>
-      </dsp:nvSpPr>
-      <dsp:spPr>
-        <a:xfrm>
-          <a:off x="7728881" y="876800"/>
-          <a:ext cx="1004062" cy="1004062"/>
-        </a:xfrm>
-        <a:prstGeom prst="rect">
-          <a:avLst/>
-        </a:prstGeom>
-        <a:blipFill>
-          <a:blip xmlns:r="http://schemas.openxmlformats.org/officeDocument/2006/relationships" r:embed="rId5">
-            <a:extLst>
-              <a:ext uri="{28A0092B-C50C-407E-A947-70E740481C1C}">
-                <a14:useLocalDpi xmlns:a14="http://schemas.microsoft.com/office/drawing/2010/main" val="0"/>
-              </a:ext>
-              <a:ext uri="{96DAC541-7B7A-43D3-8B79-37D633B846F1}">
-                <asvg:svgBlip xmlns:asvg="http://schemas.microsoft.com/office/drawing/2016/SVG/main" r:embed="rId6"/>
-              </a:ext>
-            </a:extLst>
-          </a:blip>
-          <a:srcRect/>
-          <a:stretch>
-            <a:fillRect/>
-          </a:stretch>
-        </a:blipFill>
-        <a:ln w="15875" cap="flat" cmpd="sng" algn="ctr">
-          <a:noFill/>
-          <a:prstDash val="solid"/>
-        </a:ln>
-        <a:effectLst/>
-      </dsp:spPr>
-      <dsp:style>
-        <a:lnRef idx="2">
-          <a:scrgbClr r="0" g="0" b="0"/>
-        </a:lnRef>
-        <a:fillRef idx="1">
-          <a:scrgbClr r="0" g="0" b="0"/>
-        </a:fillRef>
-        <a:effectRef idx="0">
-          <a:scrgbClr r="0" g="0" b="0"/>
-        </a:effectRef>
-        <a:fontRef idx="minor">
-          <a:schemeClr val="lt1"/>
-        </a:fontRef>
-      </dsp:style>
-    </dsp:sp>
-    <dsp:sp modelId="{1AEDC777-00B3-41D7-9AE1-23D741E941C3}">
-      <dsp:nvSpPr>
-        <dsp:cNvPr id="0" name=""/>
-        <dsp:cNvSpPr/>
-      </dsp:nvSpPr>
-      <dsp:spPr>
-        <a:xfrm>
-          <a:off x="6796537" y="2798862"/>
-          <a:ext cx="2868750" cy="720000"/>
-        </a:xfrm>
-        <a:prstGeom prst="rect">
-          <a:avLst/>
-        </a:prstGeom>
-        <a:noFill/>
-        <a:ln>
-          <a:noFill/>
-        </a:ln>
-        <a:effectLst/>
-      </dsp:spPr>
-      <dsp:style>
-        <a:lnRef idx="0">
-          <a:scrgbClr r="0" g="0" b="0"/>
-        </a:lnRef>
-        <a:fillRef idx="0">
-          <a:scrgbClr r="0" g="0" b="0"/>
-        </a:fillRef>
-        <a:effectRef idx="0">
-          <a:scrgbClr r="0" g="0" b="0"/>
-        </a:effectRef>
-        <a:fontRef idx="minor"/>
-      </dsp:style>
-      <dsp:txBody>
-        <a:bodyPr spcFirstLastPara="0" vert="horz" wrap="square" lIns="0" tIns="0" rIns="0" bIns="0" numCol="1" spcCol="1270" anchor="t" anchorCtr="0">
-          <a:noAutofit/>
-        </a:bodyPr>
-        <a:lstStyle/>
-        <a:p>
-          <a:pPr marL="0" lvl="0" indent="0" algn="ctr" defTabSz="755650">
-            <a:lnSpc>
-              <a:spcPct val="100000"/>
-            </a:lnSpc>
-            <a:spcBef>
-              <a:spcPct val="0"/>
-            </a:spcBef>
-            <a:spcAft>
-              <a:spcPct val="35000"/>
-            </a:spcAft>
-            <a:buNone/>
-            <a:defRPr cap="all"/>
-          </a:pPr>
-          <a:r>
-            <a:rPr lang="en-US" sz="1700" kern="1200" dirty="0"/>
-            <a:t>Pellentesque habitant morbi tristique senectus et netus.</a:t>
-          </a:r>
-        </a:p>
-      </dsp:txBody>
-      <dsp:txXfrm>
-        <a:off x="6796537" y="2798862"/>
-        <a:ext cx="2868750" cy="720000"/>
-      </dsp:txXfrm>
-    </dsp:sp>
-  </dsp:spTree>
-</dsp:drawing>
-</file>
-
-<file path=ppt/diagrams/layout1.xml><?xml version="1.0" encoding="utf-8"?>
-<dgm:layoutDef xmlns:dgm="http://schemas.openxmlformats.org/drawingml/2006/diagram" xmlns:a="http://schemas.openxmlformats.org/drawingml/2006/main" uniqueId="urn:microsoft.com/office/officeart/2018/5/layout/IconCircleLabelList">
-  <dgm:title val="Icon Circle Label List"/>
-  <dgm:desc val="Use to show non-sequential or grouped chunks of information accompanied by a related visuals. Works best with icons or small pictures with short text captions."/>
-  <dgm:catLst>
-    <dgm:cat type="icon" pri="500"/>
-  </dgm:catLst>
-  <dgm:sampData useDef="1">
-    <dgm:dataModel>
-      <dgm:ptLst/>
-      <dgm:bg/>
-      <dgm:whole/>
-    </dgm:dataModel>
-  </dgm:sampData>
-  <dgm:styleData useDef="1">
-    <dgm:dataModel>
-      <dgm:ptLst/>
-      <dgm:bg/>
-      <dgm:whole/>
-    </dgm:dataModel>
-  </dgm:styleData>
-  <dgm:clrData useDef="1">
-    <dgm:dataModel>
-      <dgm:ptLst/>
-      <dgm:bg/>
-      <dgm:whole/>
-    </dgm:dataModel>
-  </dgm:clrData>
-  <dgm:layoutNode name="root">
-    <dgm:varLst>
-      <dgm:dir/>
-      <dgm:resizeHandles val="exact"/>
-    </dgm:varLst>
-    <dgm:choose name="Name0">
-      <dgm:if name="Name1" axis="self" func="var" arg="dir" op="equ" val="norm">
-        <dgm:alg type="snake">
-          <dgm:param type="grDir" val="tL"/>
-          <dgm:param type="flowDir" val="row"/>
-          <dgm:param type="contDir" val="sameDir"/>
-          <dgm:param type="off" val="ctr"/>
-          <dgm:param type="vertAlign" val="mid"/>
-          <dgm:param type="horzAlign" val="ctr"/>
-        </dgm:alg>
-      </dgm:if>
-      <dgm:else name="Name2">
-        <dgm:alg type="snake">
-          <dgm:param type="grDir" val="tR"/>
-          <dgm:param type="flowDir" val="row"/>
-          <dgm:param type="contDir" val="sameDir"/>
-          <dgm:param type="off" val="ctr"/>
-          <dgm:param type="vertAlign" val="mid"/>
-          <dgm:param type="horzAlign" val="ctr"/>
-        </dgm:alg>
-      </dgm:else>
-    </dgm:choose>
-    <dgm:shape xmlns:r="http://schemas.openxmlformats.org/officeDocument/2006/relationships" r:blip="">
-      <dgm:adjLst/>
-    </dgm:shape>
-    <dgm:presOf/>
-    <dgm:choose name="Name3">
-      <dgm:if name="Name4" axis="ch" ptType="node" func="cnt" op="lte" val="2">
-        <dgm:constrLst>
-          <dgm:constr type="h" for="ch" forName="compNode" refType="h" fact="0.4"/>
-          <dgm:constr type="w" for="ch" forName="compNode" val="100"/>
-          <dgm:constr type="w" for="ch" forName="sibTrans" refType="w" refFor="ch" refForName="compNode" fact="0.175"/>
-          <dgm:constr type="sp" refType="w" refFor="ch" refForName="compNode" op="equ" fact="0.25"/>
-          <dgm:constr type="primFontSz" for="des" ptType="node" op="equ" val="44"/>
-          <dgm:constr type="h" for="des" forName="compNode" op="equ"/>
-          <dgm:constr type="h" for="des" forName="textRect" op="equ"/>
-        </dgm:constrLst>
-      </dgm:if>
-      <dgm:if name="Name5" axis="ch" ptType="node" func="cnt" op="lte" val="3">
-        <dgm:constrLst>
-          <dgm:constr type="h" for="ch" forName="compNode" refType="h" fact="0.4"/>
-          <dgm:constr type="w" for="ch" forName="compNode" val="100"/>
-          <dgm:constr type="w" for="ch" forName="sibTrans" refType="w" refFor="ch" refForName="compNode" fact="0.175"/>
-          <dgm:constr type="sp" refType="w" refFor="ch" refForName="compNode" op="equ" fact="0.25"/>
-          <dgm:constr type="primFontSz" for="des" ptType="node" op="equ" val="40"/>
-          <dgm:constr type="h" for="des" forName="compNode" op="equ"/>
-          <dgm:constr type="h" for="des" forName="textRect" op="equ"/>
-        </dgm:constrLst>
-      </dgm:if>
-      <dgm:if name="Name6" axis="ch" ptType="node" func="cnt" op="lte" val="4">
-        <dgm:constrLst>
-          <dgm:constr type="h" for="ch" forName="compNode" refType="h" fact="0.4"/>
-          <dgm:constr type="w" for="ch" forName="compNode" refType="w"/>
-          <dgm:constr type="w" for="ch" forName="sibTrans" refType="w" refFor="ch" refForName="compNode" fact="0.175"/>
-          <dgm:constr type="sp" refType="w" refFor="ch" refForName="compNode" op="equ" fact="0.25"/>
-          <dgm:constr type="primFontSz" for="des" ptType="node" op="equ" val="32"/>
-          <dgm:constr type="h" for="des" forName="compNode" op="equ"/>
-          <dgm:constr type="h" for="des" forName="textRect" op="equ"/>
-        </dgm:constrLst>
-      </dgm:if>
-      <dgm:else name="Name7">
-        <dgm:constrLst>
-          <dgm:constr type="h" for="ch" forName="compNode" refType="h" fact="0.4"/>
-          <dgm:constr type="w" for="ch" forName="compNode" refType="w"/>
-          <dgm:constr type="w" for="ch" forName="sibTrans" refType="w" refFor="ch" refForName="compNode" fact="0.175"/>
-          <dgm:constr type="sp" refType="w" refFor="ch" refForName="compNode" op="equ" fact="0.25"/>
-          <dgm:constr type="primFontSz" for="des" ptType="node" op="equ" val="24"/>
-          <dgm:constr type="h" for="des" forName="compNode" op="equ"/>
-          <dgm:constr type="h" for="des" forName="textRect" op="equ"/>
-        </dgm:constrLst>
-      </dgm:else>
-    </dgm:choose>
-    <dgm:ruleLst>
-      <dgm:rule type="w" for="ch" forName="compNode" val="50" fact="NaN" max="NaN"/>
-    </dgm:ruleLst>
-    <dgm:forEach name="Name8" axis="ch" ptType="node">
-      <dgm:layoutNode name="compNode">
-        <dgm:alg type="composite"/>
-        <dgm:shape xmlns:r="http://schemas.openxmlformats.org/officeDocument/2006/relationships" r:blip="">
-          <dgm:adjLst/>
-        </dgm:shape>
-        <dgm:presOf axis="self"/>
-        <dgm:constrLst>
-          <dgm:constr type="w" for="ch" forName="iconBgRect" refType="w" fact="0.61"/>
-          <dgm:constr type="h" for="ch" forName="iconBgRect" refType="w" refFor="ch" refForName="iconBgRect"/>
-          <dgm:constr type="t" for="ch" forName="iconBgRect"/>
-          <dgm:constr type="ctrX" for="ch" forName="iconBgRect" refType="w" fact="0.5"/>
-          <dgm:constr type="w" for="ch" forName="iconRect" refType="w" fact="0.35"/>
-          <dgm:constr type="h" for="ch" forName="iconRect" refType="w" refFor="ch" refForName="iconRect"/>
-          <dgm:constr type="ctrX" for="ch" forName="iconRect" refType="ctrX" refFor="ch" refForName="iconBgRect"/>
-          <dgm:constr type="ctrY" for="ch" forName="iconRect" refType="ctrY" refFor="ch" refForName="iconBgRect"/>
-          <dgm:constr type="h" for="ch" forName="spaceRect" refType="w" fact="0.19"/>
-          <dgm:constr type="w" for="ch" forName="spaceRect" refType="w"/>
-          <dgm:constr type="l" for="ch" forName="spaceRect"/>
-          <dgm:constr type="t" for="ch" forName="spaceRect" refType="b" refFor="ch" refForName="iconBgRect"/>
-          <dgm:constr type="h" for="ch" forName="textRect" val="20"/>
-          <dgm:constr type="w" for="ch" forName="textRect" refType="w"/>
-          <dgm:constr type="l" for="ch" forName="textRect"/>
-          <dgm:constr type="t" for="ch" forName="textRect" refType="b" refFor="ch" refForName="spaceRect"/>
-        </dgm:constrLst>
-        <dgm:ruleLst>
-          <dgm:rule type="h" val="INF" fact="NaN" max="NaN"/>
-        </dgm:ruleLst>
-        <dgm:layoutNode name="iconBgRect" styleLbl="bgShp">
-          <dgm:alg type="sp"/>
-          <dgm:shape xmlns:r="http://schemas.openxmlformats.org/officeDocument/2006/relationships" type="ellipse" r:blip="">
-            <dgm:adjLst/>
-          </dgm:shape>
-          <dgm:presOf/>
-          <dgm:constrLst/>
-          <dgm:ruleLst/>
-        </dgm:layoutNode>
-        <dgm:layoutNode name="iconRect" styleLbl="node1">
-          <dgm:alg type="sp"/>
-          <dgm:shape xmlns:r="http://schemas.openxmlformats.org/officeDocument/2006/relationships" type="rect" r:blip="" blipPhldr="1">
-            <dgm:adjLst/>
-          </dgm:shape>
-          <dgm:presOf/>
-          <dgm:constrLst/>
-          <dgm:ruleLst/>
-        </dgm:layoutNode>
-        <dgm:layoutNode name="spaceRect">
-          <dgm:alg type="sp"/>
-          <dgm:shape xmlns:r="http://schemas.openxmlformats.org/officeDocument/2006/relationships" r:blip="">
-            <dgm:adjLst/>
-          </dgm:shape>
-          <dgm:presOf/>
-          <dgm:constrLst/>
-          <dgm:ruleLst/>
-        </dgm:layoutNode>
-        <dgm:layoutNode name="textRect" styleLbl="revTx">
-          <dgm:varLst>
-            <dgm:chMax val="1"/>
-            <dgm:chPref val="1"/>
-          </dgm:varLst>
-          <dgm:alg type="tx">
-            <dgm:param type="txAnchorVert" val="t"/>
-          </dgm:alg>
-          <dgm:shape xmlns:r="http://schemas.openxmlformats.org/officeDocument/2006/relationships" type="rect" r:blip="">
-            <dgm:adjLst/>
-          </dgm:shape>
-          <dgm:presOf axis="self" ptType="node"/>
-          <dgm:constrLst>
-            <dgm:constr type="lMarg"/>
-            <dgm:constr type="rMarg"/>
-            <dgm:constr type="tMarg"/>
-            <dgm:constr type="bMarg"/>
-          </dgm:constrLst>
-          <dgm:ruleLst>
-            <dgm:rule type="primFontSz" val="11" fact="NaN" max="NaN"/>
-            <dgm:rule type="h" val="INF" fact="NaN" max="NaN"/>
-          </dgm:ruleLst>
-        </dgm:layoutNode>
-      </dgm:layoutNode>
-      <dgm:forEach name="Name9" axis="followSib" ptType="sibTrans" cnt="1">
-        <dgm:layoutNode name="sibTrans">
-          <dgm:alg type="sp"/>
-          <dgm:shape xmlns:r="http://schemas.openxmlformats.org/officeDocument/2006/relationships" r:blip="">
-            <dgm:adjLst/>
-          </dgm:shape>
-          <dgm:presOf axis="self"/>
-          <dgm:constrLst/>
-          <dgm:ruleLst/>
-        </dgm:layoutNode>
-      </dgm:forEach>
-    </dgm:forEach>
-  </dgm:layoutNode>
-  <dgm:extLst>
-    <a:ext uri="{68A01E43-0DF5-4B5B-8FA6-DAF915123BFB}">
-      <dgm1612:lstStyle xmlns:dgm1612="http://schemas.microsoft.com/office/drawing/2016/12/diagram">
-        <a:lvl1pPr>
-          <a:lnSpc>
-            <a:spcPct val="100000"/>
-          </a:lnSpc>
-          <a:defRPr cap="all"/>
-        </a:lvl1pPr>
-      </dgm1612:lstStyle>
-    </a:ext>
-  </dgm:extLst>
-</dgm:layoutDef>
-</file>
-
-<file path=ppt/diagrams/quickStyle1.xml><?xml version="1.0" encoding="utf-8"?>
-<dgm:styleDef xmlns:dgm="http://schemas.openxmlformats.org/drawingml/2006/diagram" xmlns:a="http://schemas.openxmlformats.org/drawingml/2006/main" uniqueId="urn:microsoft.com/office/officeart/2005/8/quickstyle/simple1">
-  <dgm:title val=""/>
-  <dgm:desc val=""/>
-  <dgm:catLst>
-    <dgm:cat type="simple" pri="10100"/>
-  </dgm:catLst>
-  <dgm:scene3d>
-    <a:camera prst="orthographicFront"/>
-    <a:lightRig rig="threePt" dir="t"/>
-  </dgm:scene3d>
-  <dgm:styleLbl name="node0">
-    <dgm:scene3d>
-      <a:camera prst="orthographicFront"/>
-      <a:lightRig rig="threePt" dir="t"/>
-    </dgm:scene3d>
-    <dgm:sp3d/>
-    <dgm:txPr/>
-    <dgm:style>
-      <a:lnRef idx="2">
-        <a:scrgbClr r="0" g="0" b="0"/>
-      </a:lnRef>
-      <a:fillRef idx="1">
-        <a:scrgbClr r="0" g="0" b="0"/>
-      </a:fillRef>
-      <a:effectRef idx="0">
-        <a:scrgbClr r="0" g="0" b="0"/>
-      </a:effectRef>
-      <a:fontRef idx="minor">
-        <a:schemeClr val="lt1"/>
-      </a:fontRef>
-    </dgm:style>
-  </dgm:styleLbl>
-  <dgm:styleLbl name="lnNode1">
-    <dgm:scene3d>
-      <a:camera prst="orthographicFront"/>
-      <a:lightRig rig="threePt" dir="t"/>
-    </dgm:scene3d>
-    <dgm:sp3d/>
-    <dgm:txPr/>
-    <dgm:style>
-      <a:lnRef idx="2">
-        <a:scrgbClr r="0" g="0" b="0"/>
-      </a:lnRef>
-      <a:fillRef idx="1">
-        <a:scrgbClr r="0" g="0" b="0"/>
-      </a:fillRef>
-      <a:effectRef idx="0">
-        <a:scrgbClr r="0" g="0" b="0"/>
-      </a:effectRef>
-      <a:fontRef idx="minor">
-        <a:schemeClr val="lt1"/>
-      </a:fontRef>
-    </dgm:style>
-  </dgm:styleLbl>
-  <dgm:styleLbl name="vennNode1">
-    <dgm:scene3d>
-      <a:camera prst="orthographicFront"/>
-      <a:lightRig rig="threePt" dir="t"/>
-    </dgm:scene3d>
-    <dgm:sp3d/>
-    <dgm:txPr/>
-    <dgm:style>
-      <a:lnRef idx="2">
-        <a:scrgbClr r="0" g="0" b="0"/>
-      </a:lnRef>
-      <a:fillRef idx="1">
-        <a:scrgbClr r="0" g="0" b="0"/>
-      </a:fillRef>
-      <a:effectRef idx="0">
-        <a:scrgbClr r="0" g="0" b="0"/>
-      </a:effectRef>
-      <a:fontRef idx="minor">
-        <a:schemeClr val="tx1"/>
-      </a:fontRef>
-    </dgm:style>
-  </dgm:styleLbl>
-  <dgm:styleLbl name="alignNode1">
-    <dgm:scene3d>
-      <a:camera prst="orthographicFront"/>
-      <a:lightRig rig="threePt" dir="t"/>
-    </dgm:scene3d>
-    <dgm:sp3d/>
-    <dgm:txPr/>
-    <dgm:style>
-      <a:lnRef idx="2">
-        <a:scrgbClr r="0" g="0" b="0"/>
-      </a:lnRef>
-      <a:fillRef idx="1">
-        <a:scrgbClr r="0" g="0" b="0"/>
-      </a:fillRef>
-      <a:effectRef idx="0">
-        <a:scrgbClr r="0" g="0" b="0"/>
-      </a:effectRef>
-      <a:fontRef idx="minor">
-        <a:schemeClr val="lt1"/>
-      </a:fontRef>
-    </dgm:style>
-  </dgm:styleLbl>
-  <dgm:styleLbl name="node1">
-    <dgm:scene3d>
-      <a:camera prst="orthographicFront"/>
-      <a:lightRig rig="threePt" dir="t"/>
-    </dgm:scene3d>
-    <dgm:sp3d/>
-    <dgm:txPr/>
-    <dgm:style>
-      <a:lnRef idx="2">
-        <a:scrgbClr r="0" g="0" b="0"/>
-      </a:lnRef>
-      <a:fillRef idx="1">
-        <a:scrgbClr r="0" g="0" b="0"/>
-      </a:fillRef>
-      <a:effectRef idx="0">
-        <a:scrgbClr r="0" g="0" b="0"/>
-      </a:effectRef>
-      <a:fontRef idx="minor">
-        <a:schemeClr val="lt1"/>
-      </a:fontRef>
-    </dgm:style>
-  </dgm:styleLbl>
-  <dgm:styleLbl name="node2">
-    <dgm:scene3d>
-      <a:camera prst="orthographicFront"/>
-      <a:lightRig rig="threePt" dir="t"/>
-    </dgm:scene3d>
-    <dgm:sp3d/>
-    <dgm:txPr/>
-    <dgm:style>
-      <a:lnRef idx="2">
-        <a:scrgbClr r="0" g="0" b="0"/>
-      </a:lnRef>
-      <a:fillRef idx="1">
-        <a:scrgbClr r="0" g="0" b="0"/>
-      </a:fillRef>
-      <a:effectRef idx="0">
-        <a:scrgbClr r="0" g="0" b="0"/>
-      </a:effectRef>
-      <a:fontRef idx="minor">
-        <a:schemeClr val="lt1"/>
-      </a:fontRef>
-    </dgm:style>
-  </dgm:styleLbl>
-  <dgm:styleLbl name="node3">
-    <dgm:scene3d>
-      <a:camera prst="orthographicFront"/>
-      <a:lightRig rig="threePt" dir="t"/>
-    </dgm:scene3d>
-    <dgm:sp3d/>
-    <dgm:txPr/>
-    <dgm:style>
-      <a:lnRef idx="2">
-        <a:scrgbClr r="0" g="0" b="0"/>
-      </a:lnRef>
-      <a:fillRef idx="1">
-        <a:scrgbClr r="0" g="0" b="0"/>
-      </a:fillRef>
-      <a:effectRef idx="0">
-        <a:scrgbClr r="0" g="0" b="0"/>
-      </a:effectRef>
-      <a:fontRef idx="minor">
-        <a:schemeClr val="lt1"/>
-      </a:fontRef>
-    </dgm:style>
-  </dgm:styleLbl>
-  <dgm:styleLbl name="node4">
-    <dgm:scene3d>
-      <a:camera prst="orthographicFront"/>
-      <a:lightRig rig="threePt" dir="t"/>
-    </dgm:scene3d>
-    <dgm:sp3d/>
-    <dgm:txPr/>
-    <dgm:style>
-      <a:lnRef idx="2">
-        <a:scrgbClr r="0" g="0" b="0"/>
-      </a:lnRef>
-      <a:fillRef idx="1">
-        <a:scrgbClr r="0" g="0" b="0"/>
-      </a:fillRef>
-      <a:effectRef idx="0">
-        <a:scrgbClr r="0" g="0" b="0"/>
-      </a:effectRef>
-      <a:fontRef idx="minor">
-        <a:schemeClr val="lt1"/>
-      </a:fontRef>
-    </dgm:style>
-  </dgm:styleLbl>
-  <dgm:styleLbl name="fgImgPlace1">
-    <dgm:scene3d>
-      <a:camera prst="orthographicFront"/>
-      <a:lightRig rig="threePt" dir="t"/>
-    </dgm:scene3d>
-    <dgm:sp3d/>
-    <dgm:txPr/>
-    <dgm:style>
-      <a:lnRef idx="2">
-        <a:scrgbClr r="0" g="0" b="0"/>
-      </a:lnRef>
-      <a:fillRef idx="1">
-        <a:scrgbClr r="0" g="0" b="0"/>
-      </a:fillRef>
-      <a:effectRef idx="0">
-        <a:scrgbClr r="0" g="0" b="0"/>
-      </a:effectRef>
-      <a:fontRef idx="minor"/>
-    </dgm:style>
-  </dgm:styleLbl>
-  <dgm:styleLbl name="alignImgPlace1">
-    <dgm:scene3d>
-      <a:camera prst="orthographicFront"/>
-      <a:lightRig rig="threePt" dir="t"/>
-    </dgm:scene3d>
-    <dgm:sp3d/>
-    <dgm:txPr/>
-    <dgm:style>
-      <a:lnRef idx="2">
-        <a:scrgbClr r="0" g="0" b="0"/>
-      </a:lnRef>
-      <a:fillRef idx="1">
-        <a:scrgbClr r="0" g="0" b="0"/>
-      </a:fillRef>
-      <a:effectRef idx="0">
-        <a:scrgbClr r="0" g="0" b="0"/>
-      </a:effectRef>
-      <a:fontRef idx="minor"/>
-    </dgm:style>
-  </dgm:styleLbl>
-  <dgm:styleLbl name="bgImgPlace1">
-    <dgm:scene3d>
-      <a:camera prst="orthographicFront"/>
-      <a:lightRig rig="threePt" dir="t"/>
-    </dgm:scene3d>
-    <dgm:sp3d/>
-    <dgm:txPr/>
-    <dgm:style>
-      <a:lnRef idx="2">
-        <a:scrgbClr r="0" g="0" b="0"/>
-      </a:lnRef>
-      <a:fillRef idx="1">
-        <a:scrgbClr r="0" g="0" b="0"/>
-      </a:fillRef>
-      <a:effectRef idx="0">
-        <a:scrgbClr r="0" g="0" b="0"/>
-      </a:effectRef>
-      <a:fontRef idx="minor"/>
-    </dgm:style>
-  </dgm:styleLbl>
-  <dgm:styleLbl name="sibTrans2D1">
-    <dgm:scene3d>
-      <a:camera prst="orthographicFront"/>
-      <a:lightRig rig="threePt" dir="t"/>
-    </dgm:scene3d>
-    <dgm:sp3d/>
-    <dgm:txPr/>
-    <dgm:style>
-      <a:lnRef idx="0">
-        <a:scrgbClr r="0" g="0" b="0"/>
-      </a:lnRef>
-      <a:fillRef idx="1">
-        <a:scrgbClr r="0" g="0" b="0"/>
-      </a:fillRef>
-      <a:effectRef idx="0">
-        <a:scrgbClr r="0" g="0" b="0"/>
-      </a:effectRef>
-      <a:fontRef idx="minor">
-        <a:schemeClr val="lt1"/>
-      </a:fontRef>
-    </dgm:style>
-  </dgm:styleLbl>
-  <dgm:styleLbl name="fgSibTrans2D1">
-    <dgm:scene3d>
-      <a:camera prst="orthographicFront"/>
-      <a:lightRig rig="threePt" dir="t"/>
-    </dgm:scene3d>
-    <dgm:sp3d/>
-    <dgm:txPr/>
-    <dgm:style>
-      <a:lnRef idx="0">
-        <a:scrgbClr r="0" g="0" b="0"/>
-      </a:lnRef>
-      <a:fillRef idx="1">
-        <a:scrgbClr r="0" g="0" b="0"/>
-      </a:fillRef>
-      <a:effectRef idx="0">
-        <a:scrgbClr r="0" g="0" b="0"/>
-      </a:effectRef>
-      <a:fontRef idx="minor">
-        <a:schemeClr val="lt1"/>
-      </a:fontRef>
-    </dgm:style>
-  </dgm:styleLbl>
-  <dgm:styleLbl name="bgSibTrans2D1">
-    <dgm:scene3d>
-      <a:camera prst="orthographicFront"/>
-      <a:lightRig rig="threePt" dir="t"/>
-    </dgm:scene3d>
-    <dgm:sp3d/>
-    <dgm:txPr/>
-    <dgm:style>
-      <a:lnRef idx="0">
-        <a:scrgbClr r="0" g="0" b="0"/>
-      </a:lnRef>
-      <a:fillRef idx="1">
-        <a:scrgbClr r="0" g="0" b="0"/>
-      </a:fillRef>
-      <a:effectRef idx="0">
-        <a:scrgbClr r="0" g="0" b="0"/>
-      </a:effectRef>
-      <a:fontRef idx="minor">
-        <a:schemeClr val="lt1"/>
-      </a:fontRef>
-    </dgm:style>
-  </dgm:styleLbl>
-  <dgm:styleLbl name="sibTrans1D1">
-    <dgm:scene3d>
-      <a:camera prst="orthographicFront"/>
-      <a:lightRig rig="threePt" dir="t"/>
-    </dgm:scene3d>
-    <dgm:sp3d/>
-    <dgm:txPr/>
-    <dgm:style>
-      <a:lnRef idx="1">
-        <a:scrgbClr r="0" g="0" b="0"/>
-      </a:lnRef>
-      <a:fillRef idx="0">
-        <a:scrgbClr r="0" g="0" b="0"/>
-      </a:fillRef>
-      <a:effectRef idx="0">
-        <a:scrgbClr r="0" g="0" b="0"/>
-      </a:effectRef>
-      <a:fontRef idx="minor"/>
-    </dgm:style>
-  </dgm:styleLbl>
-  <dgm:styleLbl name="callout">
-    <dgm:scene3d>
-      <a:camera prst="orthographicFront"/>
-      <a:lightRig rig="threePt" dir="t"/>
-    </dgm:scene3d>
-    <dgm:sp3d/>
-    <dgm:txPr/>
-    <dgm:style>
-      <a:lnRef idx="2">
-        <a:scrgbClr r="0" g="0" b="0"/>
-      </a:lnRef>
-      <a:fillRef idx="1">
-        <a:scrgbClr r="0" g="0" b="0"/>
-      </a:fillRef>
-      <a:effectRef idx="0">
-        <a:scrgbClr r="0" g="0" b="0"/>
-      </a:effectRef>
-      <a:fontRef idx="minor"/>
-    </dgm:style>
-  </dgm:styleLbl>
-  <dgm:styleLbl name="asst0">
-    <dgm:scene3d>
-      <a:camera prst="orthographicFront"/>
-      <a:lightRig rig="threePt" dir="t"/>
-    </dgm:scene3d>
-    <dgm:sp3d/>
-    <dgm:txPr/>
-    <dgm:style>
-      <a:lnRef idx="2">
-        <a:scrgbClr r="0" g="0" b="0"/>
-      </a:lnRef>
-      <a:fillRef idx="1">
-        <a:scrgbClr r="0" g="0" b="0"/>
-      </a:fillRef>
-      <a:effectRef idx="0">
-        <a:scrgbClr r="0" g="0" b="0"/>
-      </a:effectRef>
-      <a:fontRef idx="minor">
-        <a:schemeClr val="lt1"/>
-      </a:fontRef>
-    </dgm:style>
-  </dgm:styleLbl>
-  <dgm:styleLbl name="asst1">
-    <dgm:scene3d>
-      <a:camera prst="orthographicFront"/>
-      <a:lightRig rig="threePt" dir="t"/>
-    </dgm:scene3d>
-    <dgm:sp3d/>
-    <dgm:txPr/>
-    <dgm:style>
-      <a:lnRef idx="2">
-        <a:scrgbClr r="0" g="0" b="0"/>
-      </a:lnRef>
-      <a:fillRef idx="1">
-        <a:scrgbClr r="0" g="0" b="0"/>
-      </a:fillRef>
-      <a:effectRef idx="0">
-        <a:scrgbClr r="0" g="0" b="0"/>
-      </a:effectRef>
-      <a:fontRef idx="minor">
-        <a:schemeClr val="lt1"/>
-      </a:fontRef>
-    </dgm:style>
-  </dgm:styleLbl>
-  <dgm:styleLbl name="asst2">
-    <dgm:scene3d>
-      <a:camera prst="orthographicFront"/>
-      <a:lightRig rig="threePt" dir="t"/>
-    </dgm:scene3d>
-    <dgm:sp3d/>
-    <dgm:txPr/>
-    <dgm:style>
-      <a:lnRef idx="2">
-        <a:scrgbClr r="0" g="0" b="0"/>
-      </a:lnRef>
-      <a:fillRef idx="1">
-        <a:scrgbClr r="0" g="0" b="0"/>
-      </a:fillRef>
-      <a:effectRef idx="0">
-        <a:scrgbClr r="0" g="0" b="0"/>
-      </a:effectRef>
-      <a:fontRef idx="minor">
-        <a:schemeClr val="lt1"/>
-      </a:fontRef>
-    </dgm:style>
-  </dgm:styleLbl>
-  <dgm:styleLbl name="asst3">
-    <dgm:scene3d>
-      <a:camera prst="orthographicFront"/>
-      <a:lightRig rig="threePt" dir="t"/>
-    </dgm:scene3d>
-    <dgm:sp3d/>
-    <dgm:txPr/>
-    <dgm:style>
-      <a:lnRef idx="2">
-        <a:scrgbClr r="0" g="0" b="0"/>
-      </a:lnRef>
-      <a:fillRef idx="1">
-        <a:scrgbClr r="0" g="0" b="0"/>
-      </a:fillRef>
-      <a:effectRef idx="0">
-        <a:scrgbClr r="0" g="0" b="0"/>
-      </a:effectRef>
-      <a:fontRef idx="minor">
-        <a:schemeClr val="lt1"/>
-      </a:fontRef>
-    </dgm:style>
-  </dgm:styleLbl>
-  <dgm:styleLbl name="asst4">
-    <dgm:scene3d>
-      <a:camera prst="orthographicFront"/>
-      <a:lightRig rig="threePt" dir="t"/>
-    </dgm:scene3d>
-    <dgm:sp3d/>
-    <dgm:txPr/>
-    <dgm:style>
-      <a:lnRef idx="2">
-        <a:scrgbClr r="0" g="0" b="0"/>
-      </a:lnRef>
-      <a:fillRef idx="1">
-        <a:scrgbClr r="0" g="0" b="0"/>
-      </a:fillRef>
-      <a:effectRef idx="0">
-        <a:scrgbClr r="0" g="0" b="0"/>
-      </a:effectRef>
-      <a:fontRef idx="minor">
-        <a:schemeClr val="lt1"/>
-      </a:fontRef>
-    </dgm:style>
-  </dgm:styleLbl>
-  <dgm:styleLbl name="parChTrans2D1">
-    <dgm:scene3d>
-      <a:camera prst="orthographicFront"/>
-      <a:lightRig rig="threePt" dir="t"/>
-    </dgm:scene3d>
-    <dgm:sp3d/>
-    <dgm:txPr/>
-    <dgm:style>
-      <a:lnRef idx="2">
-        <a:scrgbClr r="0" g="0" b="0"/>
-      </a:lnRef>
-      <a:fillRef idx="1">
-        <a:scrgbClr r="0" g="0" b="0"/>
-      </a:fillRef>
-      <a:effectRef idx="0">
-        <a:scrgbClr r="0" g="0" b="0"/>
-      </a:effectRef>
-      <a:fontRef idx="minor">
-        <a:schemeClr val="lt1"/>
-      </a:fontRef>
-    </dgm:style>
-  </dgm:styleLbl>
-  <dgm:styleLbl name="parChTrans2D2">
-    <dgm:scene3d>
-      <a:camera prst="orthographicFront"/>
-      <a:lightRig rig="threePt" dir="t"/>
-    </dgm:scene3d>
-    <dgm:sp3d/>
-    <dgm:txPr/>
-    <dgm:style>
-      <a:lnRef idx="2">
-        <a:scrgbClr r="0" g="0" b="0"/>
-      </a:lnRef>
-      <a:fillRef idx="1">
-        <a:scrgbClr r="0" g="0" b="0"/>
-      </a:fillRef>
-      <a:effectRef idx="0">
-        <a:scrgbClr r="0" g="0" b="0"/>
-      </a:effectRef>
-      <a:fontRef idx="minor">
-        <a:schemeClr val="lt1"/>
-      </a:fontRef>
-    </dgm:style>
-  </dgm:styleLbl>
-  <dgm:styleLbl name="parChTrans2D3">
-    <dgm:scene3d>
-      <a:camera prst="orthographicFront"/>
-      <a:lightRig rig="threePt" dir="t"/>
-    </dgm:scene3d>
-    <dgm:sp3d/>
-    <dgm:txPr/>
-    <dgm:style>
-      <a:lnRef idx="2">
-        <a:scrgbClr r="0" g="0" b="0"/>
-      </a:lnRef>
-      <a:fillRef idx="1">
-        <a:scrgbClr r="0" g="0" b="0"/>
-      </a:fillRef>
-      <a:effectRef idx="0">
-        <a:scrgbClr r="0" g="0" b="0"/>
-      </a:effectRef>
-      <a:fontRef idx="minor">
-        <a:schemeClr val="lt1"/>
-      </a:fontRef>
-    </dgm:style>
-  </dgm:styleLbl>
-  <dgm:styleLbl name="parChTrans2D4">
-    <dgm:scene3d>
-      <a:camera prst="orthographicFront"/>
-      <a:lightRig rig="threePt" dir="t"/>
-    </dgm:scene3d>
-    <dgm:sp3d/>
-    <dgm:txPr/>
-    <dgm:style>
-      <a:lnRef idx="2">
-        <a:scrgbClr r="0" g="0" b="0"/>
-      </a:lnRef>
-      <a:fillRef idx="1">
-        <a:scrgbClr r="0" g="0" b="0"/>
-      </a:fillRef>
-      <a:effectRef idx="0">
-        <a:scrgbClr r="0" g="0" b="0"/>
-      </a:effectRef>
-      <a:fontRef idx="minor">
-        <a:schemeClr val="lt1"/>
-      </a:fontRef>
-    </dgm:style>
-  </dgm:styleLbl>
-  <dgm:styleLbl name="parChTrans1D1">
-    <dgm:scene3d>
-      <a:camera prst="orthographicFront"/>
-      <a:lightRig rig="threePt" dir="t"/>
-    </dgm:scene3d>
-    <dgm:sp3d/>
-    <dgm:txPr/>
-    <dgm:style>
-      <a:lnRef idx="2">
-        <a:scrgbClr r="0" g="0" b="0"/>
-      </a:lnRef>
-      <a:fillRef idx="0">
-        <a:scrgbClr r="0" g="0" b="0"/>
-      </a:fillRef>
-      <a:effectRef idx="0">
-        <a:scrgbClr r="0" g="0" b="0"/>
-      </a:effectRef>
-      <a:fontRef idx="minor"/>
-    </dgm:style>
-  </dgm:styleLbl>
-  <dgm:styleLbl name="parChTrans1D2">
-    <dgm:scene3d>
-      <a:camera prst="orthographicFront"/>
-      <a:lightRig rig="threePt" dir="t"/>
-    </dgm:scene3d>
-    <dgm:sp3d/>
-    <dgm:txPr/>
-    <dgm:style>
-      <a:lnRef idx="2">
-        <a:scrgbClr r="0" g="0" b="0"/>
-      </a:lnRef>
-      <a:fillRef idx="0">
-        <a:scrgbClr r="0" g="0" b="0"/>
-      </a:fillRef>
-      <a:effectRef idx="0">
-        <a:scrgbClr r="0" g="0" b="0"/>
-      </a:effectRef>
-      <a:fontRef idx="minor"/>
-    </dgm:style>
-  </dgm:styleLbl>
-  <dgm:styleLbl name="parChTrans1D3">
-    <dgm:scene3d>
-      <a:camera prst="orthographicFront"/>
-      <a:lightRig rig="threePt" dir="t"/>
-    </dgm:scene3d>
-    <dgm:sp3d/>
-    <dgm:txPr/>
-    <dgm:style>
-      <a:lnRef idx="2">
-        <a:scrgbClr r="0" g="0" b="0"/>
-      </a:lnRef>
-      <a:fillRef idx="0">
-        <a:scrgbClr r="0" g="0" b="0"/>
-      </a:fillRef>
-      <a:effectRef idx="0">
-        <a:scrgbClr r="0" g="0" b="0"/>
-      </a:effectRef>
-      <a:fontRef idx="minor"/>
-    </dgm:style>
-  </dgm:styleLbl>
-  <dgm:styleLbl name="parChTrans1D4">
-    <dgm:scene3d>
-      <a:camera prst="orthographicFront"/>
-      <a:lightRig rig="threePt" dir="t"/>
-    </dgm:scene3d>
-    <dgm:sp3d/>
-    <dgm:txPr/>
-    <dgm:style>
-      <a:lnRef idx="2">
-        <a:scrgbClr r="0" g="0" b="0"/>
-      </a:lnRef>
-      <a:fillRef idx="0">
-        <a:scrgbClr r="0" g="0" b="0"/>
-      </a:fillRef>
-      <a:effectRef idx="0">
-        <a:scrgbClr r="0" g="0" b="0"/>
-      </a:effectRef>
-      <a:fontRef idx="minor"/>
-    </dgm:style>
-  </dgm:styleLbl>
-  <dgm:styleLbl name="fgAcc1">
-    <dgm:scene3d>
-      <a:camera prst="orthographicFront"/>
-      <a:lightRig rig="threePt" dir="t"/>
-    </dgm:scene3d>
-    <dgm:sp3d/>
-    <dgm:txPr/>
-    <dgm:style>
-      <a:lnRef idx="2">
-        <a:scrgbClr r="0" g="0" b="0"/>
-      </a:lnRef>
-      <a:fillRef idx="1">
-        <a:scrgbClr r="0" g="0" b="0"/>
-      </a:fillRef>
-      <a:effectRef idx="0">
-        <a:scrgbClr r="0" g="0" b="0"/>
-      </a:effectRef>
-      <a:fontRef idx="minor"/>
-    </dgm:style>
-  </dgm:styleLbl>
-  <dgm:styleLbl name="conFgAcc1">
-    <dgm:scene3d>
-      <a:camera prst="orthographicFront"/>
-      <a:lightRig rig="threePt" dir="t"/>
-    </dgm:scene3d>
-    <dgm:sp3d/>
-    <dgm:txPr/>
-    <dgm:style>
-      <a:lnRef idx="2">
-        <a:scrgbClr r="0" g="0" b="0"/>
-      </a:lnRef>
-      <a:fillRef idx="1">
-        <a:scrgbClr r="0" g="0" b="0"/>
-      </a:fillRef>
-      <a:effectRef idx="0">
-        <a:scrgbClr r="0" g="0" b="0"/>
-      </a:effectRef>
-      <a:fontRef idx="minor"/>
-    </dgm:style>
-  </dgm:styleLbl>
-  <dgm:styleLbl name="alignAcc1">
-    <dgm:scene3d>
-      <a:camera prst="orthographicFront"/>
-      <a:lightRig rig="threePt" dir="t"/>
-    </dgm:scene3d>
-    <dgm:sp3d/>
-    <dgm:txPr/>
-    <dgm:style>
-      <a:lnRef idx="2">
-        <a:scrgbClr r="0" g="0" b="0"/>
-      </a:lnRef>
-      <a:fillRef idx="1">
-        <a:scrgbClr r="0" g="0" b="0"/>
-      </a:fillRef>
-      <a:effectRef idx="0">
-        <a:scrgbClr r="0" g="0" b="0"/>
-      </a:effectRef>
-      <a:fontRef idx="minor"/>
-    </dgm:style>
-  </dgm:styleLbl>
-  <dgm:styleLbl name="trAlignAcc1">
-    <dgm:scene3d>
-      <a:camera prst="orthographicFront"/>
-      <a:lightRig rig="threePt" dir="t"/>
-    </dgm:scene3d>
-    <dgm:sp3d/>
-    <dgm:txPr/>
-    <dgm:style>
-      <a:lnRef idx="1">
-        <a:scrgbClr r="0" g="0" b="0"/>
-      </a:lnRef>
-      <a:fillRef idx="1">
-        <a:scrgbClr r="0" g="0" b="0"/>
-      </a:fillRef>
-      <a:effectRef idx="0">
-        <a:scrgbClr r="0" g="0" b="0"/>
-      </a:effectRef>
-      <a:fontRef idx="minor"/>
-    </dgm:style>
-  </dgm:styleLbl>
-  <dgm:styleLbl name="bgAcc1">
-    <dgm:scene3d>
-      <a:camera prst="orthographicFront"/>
-      <a:lightRig rig="threePt" dir="t"/>
-    </dgm:scene3d>
-    <dgm:sp3d/>
-    <dgm:txPr/>
-    <dgm:style>
-      <a:lnRef idx="2">
-        <a:scrgbClr r="0" g="0" b="0"/>
-      </a:lnRef>
-      <a:fillRef idx="1">
-        <a:scrgbClr r="0" g="0" b="0"/>
-      </a:fillRef>
-      <a:effectRef idx="0">
-        <a:scrgbClr r="0" g="0" b="0"/>
-      </a:effectRef>
-      <a:fontRef idx="minor"/>
-    </dgm:style>
-  </dgm:styleLbl>
-  <dgm:styleLbl name="solidFgAcc1">
-    <dgm:scene3d>
-      <a:camera prst="orthographicFront"/>
-      <a:lightRig rig="threePt" dir="t"/>
-    </dgm:scene3d>
-    <dgm:sp3d/>
-    <dgm:txPr/>
-    <dgm:style>
-      <a:lnRef idx="2">
-        <a:scrgbClr r="0" g="0" b="0"/>
-      </a:lnRef>
-      <a:fillRef idx="1">
-        <a:scrgbClr r="0" g="0" b="0"/>
-      </a:fillRef>
-      <a:effectRef idx="0">
-        <a:scrgbClr r="0" g="0" b="0"/>
-      </a:effectRef>
-      <a:fontRef idx="minor"/>
-    </dgm:style>
-  </dgm:styleLbl>
-  <dgm:styleLbl name="solidAlignAcc1">
-    <dgm:scene3d>
-      <a:camera prst="orthographicFront"/>
-      <a:lightRig rig="threePt" dir="t"/>
-    </dgm:scene3d>
-    <dgm:sp3d/>
-    <dgm:txPr/>
-    <dgm:style>
-      <a:lnRef idx="2">
-        <a:scrgbClr r="0" g="0" b="0"/>
-      </a:lnRef>
-      <a:fillRef idx="1">
-        <a:scrgbClr r="0" g="0" b="0"/>
-      </a:fillRef>
-      <a:effectRef idx="0">
-        <a:scrgbClr r="0" g="0" b="0"/>
-      </a:effectRef>
-      <a:fontRef idx="minor"/>
-    </dgm:style>
-  </dgm:styleLbl>
-  <dgm:styleLbl name="solidBgAcc1">
-    <dgm:scene3d>
-      <a:camera prst="orthographicFront"/>
-      <a:lightRig rig="threePt" dir="t"/>
-    </dgm:scene3d>
-    <dgm:sp3d/>
-    <dgm:txPr/>
-    <dgm:style>
-      <a:lnRef idx="2">
-        <a:scrgbClr r="0" g="0" b="0"/>
-      </a:lnRef>
-      <a:fillRef idx="1">
-        <a:scrgbClr r="0" g="0" b="0"/>
-      </a:fillRef>
-      <a:effectRef idx="0">
-        <a:scrgbClr r="0" g="0" b="0"/>
-      </a:effectRef>
-      <a:fontRef idx="minor"/>
-    </dgm:style>
-  </dgm:styleLbl>
-  <dgm:styleLbl name="fgAccFollowNode1">
-    <dgm:scene3d>
-      <a:camera prst="orthographicFront"/>
-      <a:lightRig rig="threePt" dir="t"/>
-    </dgm:scene3d>
-    <dgm:sp3d/>
-    <dgm:txPr/>
-    <dgm:style>
-      <a:lnRef idx="2">
-        <a:scrgbClr r="0" g="0" b="0"/>
-      </a:lnRef>
-      <a:fillRef idx="1">
-        <a:scrgbClr r="0" g="0" b="0"/>
-      </a:fillRef>
-      <a:effectRef idx="0">
-        <a:scrgbClr r="0" g="0" b="0"/>
-      </a:effectRef>
-      <a:fontRef idx="minor"/>
-    </dgm:style>
-  </dgm:styleLbl>
-  <dgm:styleLbl name="alignAccFollowNode1">
-    <dgm:scene3d>
-      <a:camera prst="orthographicFront"/>
-      <a:lightRig rig="threePt" dir="t"/>
-    </dgm:scene3d>
-    <dgm:sp3d/>
-    <dgm:txPr/>
-    <dgm:style>
-      <a:lnRef idx="2">
-        <a:scrgbClr r="0" g="0" b="0"/>
-      </a:lnRef>
-      <a:fillRef idx="1">
-        <a:scrgbClr r="0" g="0" b="0"/>
-      </a:fillRef>
-      <a:effectRef idx="0">
-        <a:scrgbClr r="0" g="0" b="0"/>
-      </a:effectRef>
-      <a:fontRef idx="minor"/>
-    </dgm:style>
-  </dgm:styleLbl>
-  <dgm:styleLbl name="bgAccFollowNode1">
-    <dgm:scene3d>
-      <a:camera prst="orthographicFront"/>
-      <a:lightRig rig="threePt" dir="t"/>
-    </dgm:scene3d>
-    <dgm:sp3d/>
-    <dgm:txPr/>
-    <dgm:style>
-      <a:lnRef idx="2">
-        <a:scrgbClr r="0" g="0" b="0"/>
-      </a:lnRef>
-      <a:fillRef idx="1">
-        <a:scrgbClr r="0" g="0" b="0"/>
-      </a:fillRef>
-      <a:effectRef idx="0">
-        <a:scrgbClr r="0" g="0" b="0"/>
-      </a:effectRef>
-      <a:fontRef idx="minor"/>
-    </dgm:style>
-  </dgm:styleLbl>
-  <dgm:styleLbl name="fgAcc0">
-    <dgm:scene3d>
-      <a:camera prst="orthographicFront"/>
-      <a:lightRig rig="threePt" dir="t"/>
-    </dgm:scene3d>
-    <dgm:sp3d/>
-    <dgm:txPr/>
-    <dgm:style>
-      <a:lnRef idx="2">
-        <a:scrgbClr r="0" g="0" b="0"/>
-      </a:lnRef>
-      <a:fillRef idx="1">
-        <a:scrgbClr r="0" g="0" b="0"/>
-      </a:fillRef>
-      <a:effectRef idx="0">
-        <a:scrgbClr r="0" g="0" b="0"/>
-      </a:effectRef>
-      <a:fontRef idx="minor"/>
-    </dgm:style>
-  </dgm:styleLbl>
-  <dgm:styleLbl name="fgAcc2">
-    <dgm:scene3d>
-      <a:camera prst="orthographicFront"/>
-      <a:lightRig rig="threePt" dir="t"/>
-    </dgm:scene3d>
-    <dgm:sp3d/>
-    <dgm:txPr/>
-    <dgm:style>
-      <a:lnRef idx="2">
-        <a:scrgbClr r="0" g="0" b="0"/>
-      </a:lnRef>
-      <a:fillRef idx="1">
-        <a:scrgbClr r="0" g="0" b="0"/>
-      </a:fillRef>
-      <a:effectRef idx="0">
-        <a:scrgbClr r="0" g="0" b="0"/>
-      </a:effectRef>
-      <a:fontRef idx="minor"/>
-    </dgm:style>
-  </dgm:styleLbl>
-  <dgm:styleLbl name="fgAcc3">
-    <dgm:scene3d>
-      <a:camera prst="orthographicFront"/>
-      <a:lightRig rig="threePt" dir="t"/>
-    </dgm:scene3d>
-    <dgm:sp3d/>
-    <dgm:txPr/>
-    <dgm:style>
-      <a:lnRef idx="2">
-        <a:scrgbClr r="0" g="0" b="0"/>
-      </a:lnRef>
-      <a:fillRef idx="1">
-        <a:scrgbClr r="0" g="0" b="0"/>
-      </a:fillRef>
-      <a:effectRef idx="0">
-        <a:scrgbClr r="0" g="0" b="0"/>
-      </a:effectRef>
-      <a:fontRef idx="minor"/>
-    </dgm:style>
-  </dgm:styleLbl>
-  <dgm:styleLbl name="fgAcc4">
-    <dgm:scene3d>
-      <a:camera prst="orthographicFront"/>
-      <a:lightRig rig="threePt" dir="t"/>
-    </dgm:scene3d>
-    <dgm:sp3d/>
-    <dgm:txPr/>
-    <dgm:style>
-      <a:lnRef idx="2">
-        <a:scrgbClr r="0" g="0" b="0"/>
-      </a:lnRef>
-      <a:fillRef idx="1">
-        <a:scrgbClr r="0" g="0" b="0"/>
-      </a:fillRef>
-      <a:effectRef idx="0">
-        <a:scrgbClr r="0" g="0" b="0"/>
-      </a:effectRef>
-      <a:fontRef idx="minor"/>
-    </dgm:style>
-  </dgm:styleLbl>
-  <dgm:styleLbl name="bgShp">
-    <dgm:scene3d>
-      <a:camera prst="orthographicFront"/>
-      <a:lightRig rig="threePt" dir="t"/>
-    </dgm:scene3d>
-    <dgm:sp3d/>
-    <dgm:txPr/>
-    <dgm:style>
-      <a:lnRef idx="0">
-        <a:scrgbClr r="0" g="0" b="0"/>
-      </a:lnRef>
-      <a:fillRef idx="1">
-        <a:scrgbClr r="0" g="0" b="0"/>
-      </a:fillRef>
-      <a:effectRef idx="0">
-        <a:scrgbClr r="0" g="0" b="0"/>
-      </a:effectRef>
-      <a:fontRef idx="minor"/>
-    </dgm:style>
-  </dgm:styleLbl>
-  <dgm:styleLbl name="dkBgShp">
-    <dgm:scene3d>
-      <a:camera prst="orthographicFront"/>
-      <a:lightRig rig="threePt" dir="t"/>
-    </dgm:scene3d>
-    <dgm:sp3d/>
-    <dgm:txPr/>
-    <dgm:style>
-      <a:lnRef idx="0">
-        <a:scrgbClr r="0" g="0" b="0"/>
-      </a:lnRef>
-      <a:fillRef idx="1">
-        <a:scrgbClr r="0" g="0" b="0"/>
-      </a:fillRef>
-      <a:effectRef idx="0">
-        <a:scrgbClr r="0" g="0" b="0"/>
-      </a:effectRef>
-      <a:fontRef idx="minor"/>
-    </dgm:style>
-  </dgm:styleLbl>
-  <dgm:styleLbl name="trBgShp">
-    <dgm:scene3d>
-      <a:camera prst="orthographicFront"/>
-      <a:lightRig rig="threePt" dir="t"/>
-    </dgm:scene3d>
-    <dgm:sp3d/>
-    <dgm:txPr/>
-    <dgm:style>
-      <a:lnRef idx="0">
-        <a:scrgbClr r="0" g="0" b="0"/>
-      </a:lnRef>
-      <a:fillRef idx="1">
-        <a:scrgbClr r="0" g="0" b="0"/>
-      </a:fillRef>
-      <a:effectRef idx="0">
-        <a:scrgbClr r="0" g="0" b="0"/>
-      </a:effectRef>
-      <a:fontRef idx="minor"/>
-    </dgm:style>
-  </dgm:styleLbl>
-  <dgm:styleLbl name="fgShp">
-    <dgm:scene3d>
-      <a:camera prst="orthographicFront"/>
-      <a:lightRig rig="threePt" dir="t"/>
-    </dgm:scene3d>
-    <dgm:sp3d/>
-    <dgm:txPr/>
-    <dgm:style>
-      <a:lnRef idx="2">
-        <a:scrgbClr r="0" g="0" b="0"/>
-      </a:lnRef>
-      <a:fillRef idx="1">
-        <a:scrgbClr r="0" g="0" b="0"/>
-      </a:fillRef>
-      <a:effectRef idx="0">
-        <a:scrgbClr r="0" g="0" b="0"/>
-      </a:effectRef>
-      <a:fontRef idx="minor"/>
-    </dgm:style>
-  </dgm:styleLbl>
-  <dgm:styleLbl name="revTx">
-    <dgm:scene3d>
-      <a:camera prst="orthographicFront"/>
-      <a:lightRig rig="threePt" dir="t"/>
-    </dgm:scene3d>
-    <dgm:sp3d/>
-    <dgm:txPr/>
-    <dgm:style>
-      <a:lnRef idx="0">
-        <a:scrgbClr r="0" g="0" b="0"/>
-      </a:lnRef>
-      <a:fillRef idx="0">
-        <a:scrgbClr r="0" g="0" b="0"/>
-      </a:fillRef>
-      <a:effectRef idx="0">
-        <a:scrgbClr r="0" g="0" b="0"/>
-      </a:effectRef>
-      <a:fontRef idx="minor"/>
-    </dgm:style>
-  </dgm:styleLbl>
-</dgm:styleDef>
 </file>
 
 <file path=ppt/notesMasters/notesMaster1.xml><?xml version="1.0" encoding="utf-8"?>
@@ -23953,7 +21154,7 @@
                   <a:srgbClr val="FFFFFF"/>
                 </a:solidFill>
               </a:rPr>
-              <a:t>YJ Kim</a:t>
+              <a:t>YJ Kim (DAI #5)</a:t>
             </a:r>
           </a:p>
         </p:txBody>
@@ -24026,14 +21227,6 @@
 <file path=ppt/slides/slide2.xml><?xml version="1.0" encoding="utf-8"?>
 <p:sld xmlns:a="http://schemas.openxmlformats.org/drawingml/2006/main" xmlns:r="http://schemas.openxmlformats.org/officeDocument/2006/relationships" xmlns:p="http://schemas.openxmlformats.org/presentationml/2006/main">
   <p:cSld>
-    <p:bg>
-      <p:bgPr>
-        <a:solidFill>
-          <a:schemeClr val="bg1"/>
-        </a:solidFill>
-        <a:effectLst/>
-      </p:bgPr>
-    </p:bg>
     <p:spTree>
       <p:nvGrpSpPr>
         <p:cNvPr id="1" name=""/>
@@ -24053,7 +21246,7 @@
           <p:cNvPr id="2" name="Title 1">
             <a:extLst>
               <a:ext uri="{FF2B5EF4-FFF2-40B4-BE49-F238E27FC236}">
-                <a16:creationId xmlns:a16="http://schemas.microsoft.com/office/drawing/2014/main" id="{7A4919D0-F177-4BBA-9A0B-DBA69E2ED764}"/>
+                <a16:creationId xmlns:a16="http://schemas.microsoft.com/office/drawing/2014/main" id="{D5D0BF7D-BAA9-B9A4-F2DC-89407C589AA1}"/>
               </a:ext>
             </a:extLst>
           </p:cNvPr>
@@ -24064,60 +21257,975 @@
             <p:ph type="title"/>
           </p:nvPr>
         </p:nvSpPr>
+        <p:spPr/>
+        <p:txBody>
+          <a:bodyPr/>
+          <a:lstStyle/>
+          <a:p>
+            <a:r>
+              <a:rPr lang="en-US" dirty="0"/>
+              <a:t>Decision maker’s Interest</a:t>
+            </a:r>
+          </a:p>
+        </p:txBody>
+      </p:sp>
+      <p:sp>
+        <p:nvSpPr>
+          <p:cNvPr id="5" name="Content Placeholder 4">
+            <a:extLst>
+              <a:ext uri="{FF2B5EF4-FFF2-40B4-BE49-F238E27FC236}">
+                <a16:creationId xmlns:a16="http://schemas.microsoft.com/office/drawing/2014/main" id="{DB9AB094-6DFA-7AC3-DDF7-446EDD10169B}"/>
+              </a:ext>
+            </a:extLst>
+          </p:cNvPr>
+          <p:cNvSpPr>
+            <a:spLocks noGrp="1"/>
+          </p:cNvSpPr>
+          <p:nvPr>
+            <p:ph idx="1"/>
+          </p:nvPr>
+        </p:nvSpPr>
         <p:spPr>
           <a:xfrm>
-            <a:off x="1024128" y="585216"/>
-            <a:ext cx="9720072" cy="1499616"/>
+            <a:off x="1024127" y="1988757"/>
+            <a:ext cx="9720073" cy="4023360"/>
           </a:xfrm>
         </p:spPr>
         <p:txBody>
-          <a:bodyPr>
-            <a:normAutofit/>
+          <a:bodyPr/>
+          <a:lstStyle/>
+          <a:p>
+            <a:pPr marL="285750" indent="-285750">
+              <a:buFont typeface="Arial" panose="020B0604020202020204" pitchFamily="34" charset="0"/>
+              <a:buChar char="•"/>
+            </a:pPr>
+            <a:r>
+              <a:rPr lang="en-US" sz="2000" dirty="0"/>
+              <a:t>Current DPRK missile testing capacities and capabilities</a:t>
+            </a:r>
+            <a:endParaRPr lang="en-US" sz="2000" b="0" i="0" dirty="0">
+              <a:solidFill>
+                <a:schemeClr val="tx1"/>
+              </a:solidFill>
+              <a:effectLst/>
+            </a:endParaRPr>
+          </a:p>
+          <a:p>
+            <a:pPr marL="285750" indent="-285750">
+              <a:buFont typeface="Arial" panose="020B0604020202020204" pitchFamily="34" charset="0"/>
+              <a:buChar char="•"/>
+            </a:pPr>
+            <a:r>
+              <a:rPr lang="en-US" sz="2000" dirty="0"/>
+              <a:t>Historical progression of DPRK missile testing</a:t>
+            </a:r>
+          </a:p>
+          <a:p>
+            <a:pPr marL="285750" indent="-285750">
+              <a:buFont typeface="Arial" panose="020B0604020202020204" pitchFamily="34" charset="0"/>
+              <a:buChar char="•"/>
+            </a:pPr>
+            <a:r>
+              <a:rPr lang="en-US" sz="2000" dirty="0"/>
+              <a:t>Shifts in missile activities under different regimes</a:t>
+            </a:r>
+          </a:p>
+          <a:p>
+            <a:pPr marL="285750" indent="-285750">
+              <a:buFont typeface="Arial" panose="020B0604020202020204" pitchFamily="34" charset="0"/>
+              <a:buChar char="•"/>
+            </a:pPr>
+            <a:r>
+              <a:rPr lang="en-US" sz="2000" dirty="0"/>
+              <a:t>Analyzing DPRK military &amp; political tactics</a:t>
+            </a:r>
+          </a:p>
+          <a:p>
+            <a:endParaRPr lang="en-US" dirty="0"/>
+          </a:p>
+        </p:txBody>
+      </p:sp>
+      <p:pic>
+        <p:nvPicPr>
+          <p:cNvPr id="8" name="Picture 7">
+            <a:extLst>
+              <a:ext uri="{FF2B5EF4-FFF2-40B4-BE49-F238E27FC236}">
+                <a16:creationId xmlns:a16="http://schemas.microsoft.com/office/drawing/2014/main" id="{87A916B8-9429-DE9D-53CF-49FBFD0B0C41}"/>
+              </a:ext>
+            </a:extLst>
+          </p:cNvPr>
+          <p:cNvPicPr>
+            <a:picLocks noChangeAspect="1"/>
+          </p:cNvPicPr>
+          <p:nvPr/>
+        </p:nvPicPr>
+        <p:blipFill>
+          <a:blip r:embed="rId2" cstate="email">
+            <a:extLst>
+              <a:ext uri="{28A0092B-C50C-407E-A947-70E740481C1C}">
+                <a14:useLocalDpi xmlns:a14="http://schemas.microsoft.com/office/drawing/2010/main"/>
+              </a:ext>
+            </a:extLst>
+          </a:blip>
+          <a:stretch>
+            <a:fillRect/>
+          </a:stretch>
+        </p:blipFill>
+        <p:spPr>
+          <a:xfrm>
+            <a:off x="7238588" y="2084832"/>
+            <a:ext cx="4424892" cy="3300106"/>
+          </a:xfrm>
+          <a:prstGeom prst="rect">
+            <a:avLst/>
+          </a:prstGeom>
+        </p:spPr>
+      </p:pic>
+      <p:sp>
+        <p:nvSpPr>
+          <p:cNvPr id="9" name="Arrow: Down 8">
+            <a:extLst>
+              <a:ext uri="{FF2B5EF4-FFF2-40B4-BE49-F238E27FC236}">
+                <a16:creationId xmlns:a16="http://schemas.microsoft.com/office/drawing/2014/main" id="{C4998767-BE7F-98BD-27B2-A63C98A04C7B}"/>
+              </a:ext>
+            </a:extLst>
+          </p:cNvPr>
+          <p:cNvSpPr/>
+          <p:nvPr/>
+        </p:nvSpPr>
+        <p:spPr>
+          <a:xfrm>
+            <a:off x="3519214" y="3951168"/>
+            <a:ext cx="961534" cy="933253"/>
+          </a:xfrm>
+          <a:prstGeom prst="downArrow">
+            <a:avLst/>
+          </a:prstGeom>
+        </p:spPr>
+        <p:style>
+          <a:lnRef idx="2">
+            <a:schemeClr val="accent1">
+              <a:shade val="15000"/>
+            </a:schemeClr>
+          </a:lnRef>
+          <a:fillRef idx="1">
+            <a:schemeClr val="accent1"/>
+          </a:fillRef>
+          <a:effectRef idx="0">
+            <a:schemeClr val="accent1"/>
+          </a:effectRef>
+          <a:fontRef idx="minor">
+            <a:schemeClr val="lt1"/>
+          </a:fontRef>
+        </p:style>
+        <p:txBody>
+          <a:bodyPr rtlCol="0" anchor="ctr"/>
+          <a:lstStyle/>
+          <a:p>
+            <a:pPr algn="ctr"/>
+            <a:endParaRPr lang="en-US"/>
+          </a:p>
+        </p:txBody>
+      </p:sp>
+      <p:sp>
+        <p:nvSpPr>
+          <p:cNvPr id="11" name="TextBox 10">
+            <a:extLst>
+              <a:ext uri="{FF2B5EF4-FFF2-40B4-BE49-F238E27FC236}">
+                <a16:creationId xmlns:a16="http://schemas.microsoft.com/office/drawing/2014/main" id="{1C6353F0-DAA6-DA7F-507D-15949AAED541}"/>
+              </a:ext>
+            </a:extLst>
+          </p:cNvPr>
+          <p:cNvSpPr txBox="1"/>
+          <p:nvPr/>
+        </p:nvSpPr>
+        <p:spPr>
+          <a:xfrm>
+            <a:off x="952767" y="5001993"/>
+            <a:ext cx="6094428" cy="892552"/>
+          </a:xfrm>
+          <a:prstGeom prst="rect">
+            <a:avLst/>
+          </a:prstGeom>
+          <a:noFill/>
+        </p:spPr>
+        <p:txBody>
+          <a:bodyPr wrap="square">
+            <a:spAutoFit/>
+          </a:bodyPr>
+          <a:lstStyle/>
+          <a:p>
+            <a:pPr algn="ctr"/>
+            <a:r>
+              <a:rPr lang="en-US" sz="2800" b="1" dirty="0">
+                <a:solidFill>
+                  <a:schemeClr val="tx1"/>
+                </a:solidFill>
+              </a:rPr>
+              <a:t>Ultimate Objective</a:t>
+            </a:r>
+          </a:p>
+          <a:p>
+            <a:pPr algn="ctr"/>
+            <a:r>
+              <a:rPr lang="en-US" sz="2400" b="1" dirty="0">
+                <a:solidFill>
+                  <a:schemeClr val="tx1"/>
+                </a:solidFill>
+              </a:rPr>
+              <a:t>Strategic defense decision making process</a:t>
+            </a:r>
+          </a:p>
+        </p:txBody>
+      </p:sp>
+    </p:spTree>
+    <p:extLst>
+      <p:ext uri="{BB962C8B-B14F-4D97-AF65-F5344CB8AC3E}">
+        <p14:creationId xmlns:p14="http://schemas.microsoft.com/office/powerpoint/2010/main" val="1481753309"/>
+      </p:ext>
+    </p:extLst>
+  </p:cSld>
+  <p:clrMapOvr>
+    <a:masterClrMapping/>
+  </p:clrMapOvr>
+</p:sld>
+</file>
+
+<file path=ppt/slides/slide3.xml><?xml version="1.0" encoding="utf-8"?>
+<p:sld xmlns:a="http://schemas.openxmlformats.org/drawingml/2006/main" xmlns:r="http://schemas.openxmlformats.org/officeDocument/2006/relationships" xmlns:p="http://schemas.openxmlformats.org/presentationml/2006/main">
+  <p:cSld>
+    <p:spTree>
+      <p:nvGrpSpPr>
+        <p:cNvPr id="1" name=""/>
+        <p:cNvGrpSpPr/>
+        <p:nvPr/>
+      </p:nvGrpSpPr>
+      <p:grpSpPr>
+        <a:xfrm>
+          <a:off x="0" y="0"/>
+          <a:ext cx="0" cy="0"/>
+          <a:chOff x="0" y="0"/>
+          <a:chExt cx="0" cy="0"/>
+        </a:xfrm>
+      </p:grpSpPr>
+      <p:sp>
+        <p:nvSpPr>
+          <p:cNvPr id="2" name="Title 1">
+            <a:extLst>
+              <a:ext uri="{FF2B5EF4-FFF2-40B4-BE49-F238E27FC236}">
+                <a16:creationId xmlns:a16="http://schemas.microsoft.com/office/drawing/2014/main" id="{D5D0BF7D-BAA9-B9A4-F2DC-89407C589AA1}"/>
+              </a:ext>
+            </a:extLst>
+          </p:cNvPr>
+          <p:cNvSpPr>
+            <a:spLocks noGrp="1"/>
+          </p:cNvSpPr>
+          <p:nvPr>
+            <p:ph type="title"/>
+          </p:nvPr>
+        </p:nvSpPr>
+        <p:spPr/>
+        <p:txBody>
+          <a:bodyPr/>
+          <a:lstStyle/>
+          <a:p>
+            <a:r>
+              <a:rPr lang="en-US" dirty="0"/>
+              <a:t>Agenda</a:t>
+            </a:r>
+          </a:p>
+        </p:txBody>
+      </p:sp>
+      <p:sp>
+        <p:nvSpPr>
+          <p:cNvPr id="3" name="Content Placeholder 2">
+            <a:extLst>
+              <a:ext uri="{FF2B5EF4-FFF2-40B4-BE49-F238E27FC236}">
+                <a16:creationId xmlns:a16="http://schemas.microsoft.com/office/drawing/2014/main" id="{3935654A-7001-7C3D-BDD0-9A2D8CE7F702}"/>
+              </a:ext>
+            </a:extLst>
+          </p:cNvPr>
+          <p:cNvSpPr>
+            <a:spLocks noGrp="1"/>
+          </p:cNvSpPr>
+          <p:nvPr>
+            <p:ph idx="1"/>
+          </p:nvPr>
+        </p:nvSpPr>
+        <p:spPr/>
+        <p:txBody>
+          <a:bodyPr/>
+          <a:lstStyle/>
+          <a:p>
+            <a:pPr marL="285750" indent="-285750">
+              <a:buFont typeface="Arial" panose="020B0604020202020204" pitchFamily="34" charset="0"/>
+              <a:buChar char="•"/>
+            </a:pPr>
+            <a:r>
+              <a:rPr lang="en-US" sz="2000" dirty="0"/>
+              <a:t>Overview of DPRK Missile Facility Locations </a:t>
+            </a:r>
+          </a:p>
+          <a:p>
+            <a:pPr marL="285750" indent="-285750">
+              <a:buFont typeface="Arial" panose="020B0604020202020204" pitchFamily="34" charset="0"/>
+              <a:buChar char="•"/>
+            </a:pPr>
+            <a:r>
+              <a:rPr lang="en-US" sz="2000" dirty="0"/>
+              <a:t>Number of missile tests by timeline</a:t>
+            </a:r>
+          </a:p>
+          <a:p>
+            <a:pPr marL="285750" indent="-285750">
+              <a:buFont typeface="Arial" panose="020B0604020202020204" pitchFamily="34" charset="0"/>
+              <a:buChar char="•"/>
+            </a:pPr>
+            <a:r>
+              <a:rPr lang="en-US" sz="2000" dirty="0"/>
+              <a:t>Number of successes and failures by facility names</a:t>
+            </a:r>
+          </a:p>
+          <a:p>
+            <a:pPr marL="285750" indent="-285750">
+              <a:buFont typeface="Arial" panose="020B0604020202020204" pitchFamily="34" charset="0"/>
+              <a:buChar char="•"/>
+            </a:pPr>
+            <a:r>
+              <a:rPr lang="en-US" sz="2000" dirty="0"/>
+              <a:t>DPRK missile traveled distance expansions by timeline</a:t>
+            </a:r>
+          </a:p>
+          <a:p>
+            <a:pPr marL="285750" indent="-285750">
+              <a:buFont typeface="Arial" panose="020B0604020202020204" pitchFamily="34" charset="0"/>
+              <a:buChar char="•"/>
+            </a:pPr>
+            <a:r>
+              <a:rPr lang="en-US" sz="2000" dirty="0"/>
+              <a:t>DPRK Missile Landing Location groups</a:t>
+            </a:r>
+          </a:p>
+        </p:txBody>
+      </p:sp>
+      <p:pic>
+        <p:nvPicPr>
+          <p:cNvPr id="6" name="Picture 5">
+            <a:extLst>
+              <a:ext uri="{FF2B5EF4-FFF2-40B4-BE49-F238E27FC236}">
+                <a16:creationId xmlns:a16="http://schemas.microsoft.com/office/drawing/2014/main" id="{555A64DF-40B8-B39C-654E-5EC964C89821}"/>
+              </a:ext>
+            </a:extLst>
+          </p:cNvPr>
+          <p:cNvPicPr>
+            <a:picLocks noChangeAspect="1"/>
+          </p:cNvPicPr>
+          <p:nvPr/>
+        </p:nvPicPr>
+        <p:blipFill>
+          <a:blip r:embed="rId2" cstate="screen">
+            <a:extLst>
+              <a:ext uri="{28A0092B-C50C-407E-A947-70E740481C1C}">
+                <a14:useLocalDpi xmlns:a14="http://schemas.microsoft.com/office/drawing/2010/main"/>
+              </a:ext>
+            </a:extLst>
+          </a:blip>
+          <a:stretch>
+            <a:fillRect/>
+          </a:stretch>
+        </p:blipFill>
+        <p:spPr>
+          <a:xfrm>
+            <a:off x="7102567" y="1834152"/>
+            <a:ext cx="4507179" cy="3189696"/>
+          </a:xfrm>
+          <a:prstGeom prst="rect">
+            <a:avLst/>
+          </a:prstGeom>
+        </p:spPr>
+      </p:pic>
+    </p:spTree>
+    <p:extLst>
+      <p:ext uri="{BB962C8B-B14F-4D97-AF65-F5344CB8AC3E}">
+        <p14:creationId xmlns:p14="http://schemas.microsoft.com/office/powerpoint/2010/main" val="1560653562"/>
+      </p:ext>
+    </p:extLst>
+  </p:cSld>
+  <p:clrMapOvr>
+    <a:masterClrMapping/>
+  </p:clrMapOvr>
+</p:sld>
+</file>
+
+<file path=ppt/slides/slide4.xml><?xml version="1.0" encoding="utf-8"?>
+<p:sld xmlns:a="http://schemas.openxmlformats.org/drawingml/2006/main" xmlns:r="http://schemas.openxmlformats.org/officeDocument/2006/relationships" xmlns:p="http://schemas.openxmlformats.org/presentationml/2006/main">
+  <p:cSld>
+    <p:spTree>
+      <p:nvGrpSpPr>
+        <p:cNvPr id="1" name=""/>
+        <p:cNvGrpSpPr/>
+        <p:nvPr/>
+      </p:nvGrpSpPr>
+      <p:grpSpPr>
+        <a:xfrm>
+          <a:off x="0" y="0"/>
+          <a:ext cx="0" cy="0"/>
+          <a:chOff x="0" y="0"/>
+          <a:chExt cx="0" cy="0"/>
+        </a:xfrm>
+      </p:grpSpPr>
+      <p:sp>
+        <p:nvSpPr>
+          <p:cNvPr id="2" name="Title 1">
+            <a:extLst>
+              <a:ext uri="{FF2B5EF4-FFF2-40B4-BE49-F238E27FC236}">
+                <a16:creationId xmlns:a16="http://schemas.microsoft.com/office/drawing/2014/main" id="{DD8A94D9-433E-003C-733B-A5C97E922080}"/>
+              </a:ext>
+            </a:extLst>
+          </p:cNvPr>
+          <p:cNvSpPr>
+            <a:spLocks noGrp="1"/>
+          </p:cNvSpPr>
+          <p:nvPr>
+            <p:ph type="title"/>
+          </p:nvPr>
+        </p:nvSpPr>
+        <p:spPr/>
+        <p:txBody>
+          <a:bodyPr/>
+          <a:lstStyle/>
+          <a:p>
+            <a:r>
+              <a:rPr lang="en-US" dirty="0"/>
+              <a:t>Data of interest</a:t>
+            </a:r>
+          </a:p>
+        </p:txBody>
+      </p:sp>
+      <p:sp>
+        <p:nvSpPr>
+          <p:cNvPr id="3" name="Content Placeholder 2">
+            <a:extLst>
+              <a:ext uri="{FF2B5EF4-FFF2-40B4-BE49-F238E27FC236}">
+                <a16:creationId xmlns:a16="http://schemas.microsoft.com/office/drawing/2014/main" id="{2D9CF302-C2CF-954D-8679-75171FE73D99}"/>
+              </a:ext>
+            </a:extLst>
+          </p:cNvPr>
+          <p:cNvSpPr>
+            <a:spLocks noGrp="1"/>
+          </p:cNvSpPr>
+          <p:nvPr>
+            <p:ph idx="1"/>
+          </p:nvPr>
+        </p:nvSpPr>
+        <p:spPr>
+          <a:xfrm>
+            <a:off x="675336" y="1908928"/>
+            <a:ext cx="5056161" cy="4023360"/>
+          </a:xfrm>
+        </p:spPr>
+        <p:txBody>
+          <a:bodyPr/>
+          <a:lstStyle/>
+          <a:p>
+            <a:pPr marL="285750" indent="-285750">
+              <a:buFont typeface="Arial" panose="020B0604020202020204" pitchFamily="34" charset="0"/>
+              <a:buChar char="•"/>
+            </a:pPr>
+            <a:r>
+              <a:rPr lang="en-US" sz="2400" dirty="0"/>
+              <a:t>Facility names</a:t>
+            </a:r>
+          </a:p>
+          <a:p>
+            <a:pPr marL="285750" indent="-285750">
+              <a:buFont typeface="Arial" panose="020B0604020202020204" pitchFamily="34" charset="0"/>
+              <a:buChar char="•"/>
+            </a:pPr>
+            <a:r>
+              <a:rPr lang="en-US" sz="2400" dirty="0"/>
+              <a:t>Facility locations (Lat/Lon)</a:t>
+            </a:r>
+          </a:p>
+          <a:p>
+            <a:pPr marL="285750" indent="-285750">
+              <a:buFont typeface="Arial" panose="020B0604020202020204" pitchFamily="34" charset="0"/>
+              <a:buChar char="•"/>
+            </a:pPr>
+            <a:r>
+              <a:rPr lang="en-US" sz="2400" dirty="0"/>
+              <a:t>Dates</a:t>
+            </a:r>
+          </a:p>
+          <a:p>
+            <a:pPr marL="285750" indent="-285750">
+              <a:buFont typeface="Arial" panose="020B0604020202020204" pitchFamily="34" charset="0"/>
+              <a:buChar char="•"/>
+            </a:pPr>
+            <a:r>
+              <a:rPr lang="en-US" sz="2400" dirty="0"/>
+              <a:t>Distance</a:t>
+            </a:r>
+          </a:p>
+          <a:p>
+            <a:pPr marL="285750" indent="-285750">
+              <a:buFont typeface="Arial" panose="020B0604020202020204" pitchFamily="34" charset="0"/>
+              <a:buChar char="•"/>
+            </a:pPr>
+            <a:r>
+              <a:rPr lang="en-US" sz="2400" dirty="0"/>
+              <a:t>Landing locations</a:t>
+            </a:r>
+          </a:p>
+          <a:p>
+            <a:pPr marL="285750" indent="-285750">
+              <a:buFont typeface="Arial" panose="020B0604020202020204" pitchFamily="34" charset="0"/>
+              <a:buChar char="•"/>
+            </a:pPr>
+            <a:r>
+              <a:rPr lang="en-US" sz="2400" dirty="0"/>
+              <a:t>Test outcomes</a:t>
+            </a:r>
+          </a:p>
+          <a:p>
+            <a:pPr marL="285750" indent="-285750">
+              <a:buFont typeface="Arial" panose="020B0604020202020204" pitchFamily="34" charset="0"/>
+              <a:buChar char="•"/>
+            </a:pPr>
+            <a:endParaRPr lang="en-US" sz="2400" dirty="0"/>
+          </a:p>
+          <a:p>
+            <a:pPr marL="0" indent="0">
+              <a:buNone/>
+            </a:pPr>
+            <a:endParaRPr lang="en-US" dirty="0"/>
+          </a:p>
+        </p:txBody>
+      </p:sp>
+      <p:pic>
+        <p:nvPicPr>
+          <p:cNvPr id="7" name="Picture 6">
+            <a:extLst>
+              <a:ext uri="{FF2B5EF4-FFF2-40B4-BE49-F238E27FC236}">
+                <a16:creationId xmlns:a16="http://schemas.microsoft.com/office/drawing/2014/main" id="{D885BBB7-3C6B-EC66-8C5C-D93832104F1B}"/>
+              </a:ext>
+            </a:extLst>
+          </p:cNvPr>
+          <p:cNvPicPr>
+            <a:picLocks noChangeAspect="1"/>
+          </p:cNvPicPr>
+          <p:nvPr/>
+        </p:nvPicPr>
+        <p:blipFill>
+          <a:blip r:embed="rId2"/>
+          <a:stretch>
+            <a:fillRect/>
+          </a:stretch>
+        </p:blipFill>
+        <p:spPr>
+          <a:xfrm>
+            <a:off x="4930219" y="1736322"/>
+            <a:ext cx="6586445" cy="3615051"/>
+          </a:xfrm>
+          <a:prstGeom prst="rect">
+            <a:avLst/>
+          </a:prstGeom>
+          <a:ln>
+            <a:solidFill>
+              <a:schemeClr val="accent1">
+                <a:shade val="15000"/>
+              </a:schemeClr>
+            </a:solidFill>
+          </a:ln>
+        </p:spPr>
+      </p:pic>
+      <p:sp>
+        <p:nvSpPr>
+          <p:cNvPr id="11" name="TextBox 10">
+            <a:extLst>
+              <a:ext uri="{FF2B5EF4-FFF2-40B4-BE49-F238E27FC236}">
+                <a16:creationId xmlns:a16="http://schemas.microsoft.com/office/drawing/2014/main" id="{8B612CE2-8481-1A02-C24F-531C4F7A7165}"/>
+              </a:ext>
+            </a:extLst>
+          </p:cNvPr>
+          <p:cNvSpPr txBox="1"/>
+          <p:nvPr/>
+        </p:nvSpPr>
+        <p:spPr>
+          <a:xfrm>
+            <a:off x="6950170" y="5351373"/>
+            <a:ext cx="2537115" cy="369332"/>
+          </a:xfrm>
+          <a:prstGeom prst="rect">
+            <a:avLst/>
+          </a:prstGeom>
+          <a:noFill/>
+        </p:spPr>
+        <p:txBody>
+          <a:bodyPr wrap="square">
+            <a:spAutoFit/>
           </a:bodyPr>
           <a:lstStyle/>
           <a:p>
             <a:r>
               <a:rPr lang="en-US" dirty="0"/>
-              <a:t>Title Lorem Ipsum Dolor</a:t>
+              <a:t>(245 rows × 20 columns)</a:t>
             </a:r>
           </a:p>
         </p:txBody>
       </p:sp>
-      <p:graphicFrame>
-        <p:nvGraphicFramePr>
-          <p:cNvPr id="5" name="Content Placeholder 2" descr="SmartArt graphic placeholder">
+      <p:sp>
+        <p:nvSpPr>
+          <p:cNvPr id="13" name="Rectangle 12">
             <a:extLst>
               <a:ext uri="{FF2B5EF4-FFF2-40B4-BE49-F238E27FC236}">
-                <a16:creationId xmlns:a16="http://schemas.microsoft.com/office/drawing/2014/main" id="{91DB1382-7276-49FA-9632-38D558F457E3}"/>
+                <a16:creationId xmlns:a16="http://schemas.microsoft.com/office/drawing/2014/main" id="{C8885458-FDF1-02EF-F87A-FADAC4F690C1}"/>
               </a:ext>
             </a:extLst>
           </p:cNvPr>
-          <p:cNvGraphicFramePr>
-            <a:graphicFrameLocks noGrp="1"/>
-          </p:cNvGraphicFramePr>
-          <p:nvPr>
-            <p:ph idx="1"/>
-            <p:extLst>
-              <p:ext uri="{D42A27DB-BD31-4B8C-83A1-F6EECF244321}">
-                <p14:modId xmlns:p14="http://schemas.microsoft.com/office/powerpoint/2010/main" val="1429673402"/>
-              </p:ext>
-            </p:extLst>
-          </p:nvPr>
-        </p:nvGraphicFramePr>
-        <p:xfrm>
-          <a:off x="1023938" y="2286000"/>
-          <a:ext cx="9720262" cy="4022725"/>
-        </p:xfrm>
-        <a:graphic>
-          <a:graphicData uri="http://schemas.openxmlformats.org/drawingml/2006/diagram">
-            <dgm:relIds xmlns:dgm="http://schemas.openxmlformats.org/drawingml/2006/diagram" xmlns:r="http://schemas.openxmlformats.org/officeDocument/2006/relationships" r:dm="rId2" r:lo="rId3" r:qs="rId4" r:cs="rId5"/>
-          </a:graphicData>
-        </a:graphic>
-      </p:graphicFrame>
+          <p:cNvSpPr/>
+          <p:nvPr/>
+        </p:nvSpPr>
+        <p:spPr>
+          <a:xfrm>
+            <a:off x="6299722" y="2017336"/>
+            <a:ext cx="245098" cy="3334037"/>
+          </a:xfrm>
+          <a:prstGeom prst="rect">
+            <a:avLst/>
+          </a:prstGeom>
+          <a:solidFill>
+            <a:srgbClr val="FFFF00">
+              <a:alpha val="36000"/>
+            </a:srgbClr>
+          </a:solidFill>
+          <a:ln w="6350">
+            <a:solidFill>
+              <a:schemeClr val="accent1">
+                <a:shade val="15000"/>
+              </a:schemeClr>
+            </a:solidFill>
+          </a:ln>
+        </p:spPr>
+        <p:style>
+          <a:lnRef idx="2">
+            <a:schemeClr val="accent1">
+              <a:shade val="15000"/>
+            </a:schemeClr>
+          </a:lnRef>
+          <a:fillRef idx="1">
+            <a:schemeClr val="accent1"/>
+          </a:fillRef>
+          <a:effectRef idx="0">
+            <a:schemeClr val="accent1"/>
+          </a:effectRef>
+          <a:fontRef idx="minor">
+            <a:schemeClr val="lt1"/>
+          </a:fontRef>
+        </p:style>
+        <p:txBody>
+          <a:bodyPr rtlCol="0" anchor="ctr"/>
+          <a:lstStyle/>
+          <a:p>
+            <a:pPr algn="ctr"/>
+            <a:endParaRPr lang="en-US"/>
+          </a:p>
+        </p:txBody>
+      </p:sp>
+      <p:sp>
+        <p:nvSpPr>
+          <p:cNvPr id="14" name="Rectangle 13">
+            <a:extLst>
+              <a:ext uri="{FF2B5EF4-FFF2-40B4-BE49-F238E27FC236}">
+                <a16:creationId xmlns:a16="http://schemas.microsoft.com/office/drawing/2014/main" id="{9C1DC9E7-67A1-2623-28D9-352A72A294F9}"/>
+              </a:ext>
+            </a:extLst>
+          </p:cNvPr>
+          <p:cNvSpPr/>
+          <p:nvPr/>
+        </p:nvSpPr>
+        <p:spPr>
+          <a:xfrm>
+            <a:off x="7345707" y="2017336"/>
+            <a:ext cx="619941" cy="3334037"/>
+          </a:xfrm>
+          <a:prstGeom prst="rect">
+            <a:avLst/>
+          </a:prstGeom>
+          <a:solidFill>
+            <a:srgbClr val="FFFF00">
+              <a:alpha val="36000"/>
+            </a:srgbClr>
+          </a:solidFill>
+          <a:ln w="6350">
+            <a:solidFill>
+              <a:schemeClr val="accent1">
+                <a:shade val="15000"/>
+              </a:schemeClr>
+            </a:solidFill>
+          </a:ln>
+        </p:spPr>
+        <p:style>
+          <a:lnRef idx="2">
+            <a:schemeClr val="accent1">
+              <a:shade val="15000"/>
+            </a:schemeClr>
+          </a:lnRef>
+          <a:fillRef idx="1">
+            <a:schemeClr val="accent1"/>
+          </a:fillRef>
+          <a:effectRef idx="0">
+            <a:schemeClr val="accent1"/>
+          </a:effectRef>
+          <a:fontRef idx="minor">
+            <a:schemeClr val="lt1"/>
+          </a:fontRef>
+        </p:style>
+        <p:txBody>
+          <a:bodyPr rtlCol="0" anchor="ctr"/>
+          <a:lstStyle/>
+          <a:p>
+            <a:pPr algn="ctr"/>
+            <a:endParaRPr lang="en-US"/>
+          </a:p>
+        </p:txBody>
+      </p:sp>
+      <p:sp>
+        <p:nvSpPr>
+          <p:cNvPr id="15" name="Rectangle 14">
+            <a:extLst>
+              <a:ext uri="{FF2B5EF4-FFF2-40B4-BE49-F238E27FC236}">
+                <a16:creationId xmlns:a16="http://schemas.microsoft.com/office/drawing/2014/main" id="{48374090-D420-533D-CC60-711AC122D922}"/>
+              </a:ext>
+            </a:extLst>
+          </p:cNvPr>
+          <p:cNvSpPr/>
+          <p:nvPr/>
+        </p:nvSpPr>
+        <p:spPr>
+          <a:xfrm>
+            <a:off x="9177314" y="2017336"/>
+            <a:ext cx="997602" cy="3334037"/>
+          </a:xfrm>
+          <a:prstGeom prst="rect">
+            <a:avLst/>
+          </a:prstGeom>
+          <a:solidFill>
+            <a:srgbClr val="FFFF00">
+              <a:alpha val="36000"/>
+            </a:srgbClr>
+          </a:solidFill>
+          <a:ln w="6350">
+            <a:solidFill>
+              <a:schemeClr val="accent1">
+                <a:shade val="15000"/>
+              </a:schemeClr>
+            </a:solidFill>
+          </a:ln>
+        </p:spPr>
+        <p:style>
+          <a:lnRef idx="2">
+            <a:schemeClr val="accent1">
+              <a:shade val="15000"/>
+            </a:schemeClr>
+          </a:lnRef>
+          <a:fillRef idx="1">
+            <a:schemeClr val="accent1"/>
+          </a:fillRef>
+          <a:effectRef idx="0">
+            <a:schemeClr val="accent1"/>
+          </a:effectRef>
+          <a:fontRef idx="minor">
+            <a:schemeClr val="lt1"/>
+          </a:fontRef>
+        </p:style>
+        <p:txBody>
+          <a:bodyPr rtlCol="0" anchor="ctr"/>
+          <a:lstStyle/>
+          <a:p>
+            <a:pPr algn="ctr"/>
+            <a:endParaRPr lang="en-US"/>
+          </a:p>
+        </p:txBody>
+      </p:sp>
+      <p:sp>
+        <p:nvSpPr>
+          <p:cNvPr id="16" name="Rectangle 15">
+            <a:extLst>
+              <a:ext uri="{FF2B5EF4-FFF2-40B4-BE49-F238E27FC236}">
+                <a16:creationId xmlns:a16="http://schemas.microsoft.com/office/drawing/2014/main" id="{7FC5A4F0-44B3-83CA-3D02-85C3E57CA9A3}"/>
+              </a:ext>
+            </a:extLst>
+          </p:cNvPr>
+          <p:cNvSpPr/>
+          <p:nvPr/>
+        </p:nvSpPr>
+        <p:spPr>
+          <a:xfrm>
+            <a:off x="10489662" y="2017335"/>
+            <a:ext cx="254537" cy="3334037"/>
+          </a:xfrm>
+          <a:prstGeom prst="rect">
+            <a:avLst/>
+          </a:prstGeom>
+          <a:solidFill>
+            <a:srgbClr val="FFFF00">
+              <a:alpha val="36000"/>
+            </a:srgbClr>
+          </a:solidFill>
+          <a:ln w="6350">
+            <a:solidFill>
+              <a:schemeClr val="accent1">
+                <a:shade val="15000"/>
+              </a:schemeClr>
+            </a:solidFill>
+          </a:ln>
+        </p:spPr>
+        <p:style>
+          <a:lnRef idx="2">
+            <a:schemeClr val="accent1">
+              <a:shade val="15000"/>
+            </a:schemeClr>
+          </a:lnRef>
+          <a:fillRef idx="1">
+            <a:schemeClr val="accent1"/>
+          </a:fillRef>
+          <a:effectRef idx="0">
+            <a:schemeClr val="accent1"/>
+          </a:effectRef>
+          <a:fontRef idx="minor">
+            <a:schemeClr val="lt1"/>
+          </a:fontRef>
+        </p:style>
+        <p:txBody>
+          <a:bodyPr rtlCol="0" anchor="ctr"/>
+          <a:lstStyle/>
+          <a:p>
+            <a:pPr algn="ctr"/>
+            <a:endParaRPr lang="en-US"/>
+          </a:p>
+        </p:txBody>
+      </p:sp>
+      <p:sp>
+        <p:nvSpPr>
+          <p:cNvPr id="18" name="Rectangle 17">
+            <a:extLst>
+              <a:ext uri="{FF2B5EF4-FFF2-40B4-BE49-F238E27FC236}">
+                <a16:creationId xmlns:a16="http://schemas.microsoft.com/office/drawing/2014/main" id="{D7AE31C6-60FA-C43F-4FF9-87BB1355E8B7}"/>
+              </a:ext>
+            </a:extLst>
+          </p:cNvPr>
+          <p:cNvSpPr/>
+          <p:nvPr/>
+        </p:nvSpPr>
+        <p:spPr>
+          <a:xfrm>
+            <a:off x="11160536" y="2017334"/>
+            <a:ext cx="356128" cy="3334037"/>
+          </a:xfrm>
+          <a:prstGeom prst="rect">
+            <a:avLst/>
+          </a:prstGeom>
+          <a:solidFill>
+            <a:srgbClr val="FFFF00">
+              <a:alpha val="36000"/>
+            </a:srgbClr>
+          </a:solidFill>
+          <a:ln w="6350">
+            <a:solidFill>
+              <a:schemeClr val="accent1">
+                <a:shade val="15000"/>
+              </a:schemeClr>
+            </a:solidFill>
+          </a:ln>
+        </p:spPr>
+        <p:style>
+          <a:lnRef idx="2">
+            <a:schemeClr val="accent1">
+              <a:shade val="15000"/>
+            </a:schemeClr>
+          </a:lnRef>
+          <a:fillRef idx="1">
+            <a:schemeClr val="accent1"/>
+          </a:fillRef>
+          <a:effectRef idx="0">
+            <a:schemeClr val="accent1"/>
+          </a:effectRef>
+          <a:fontRef idx="minor">
+            <a:schemeClr val="lt1"/>
+          </a:fontRef>
+        </p:style>
+        <p:txBody>
+          <a:bodyPr rtlCol="0" anchor="ctr"/>
+          <a:lstStyle/>
+          <a:p>
+            <a:pPr algn="ctr"/>
+            <a:endParaRPr lang="en-US"/>
+          </a:p>
+        </p:txBody>
+      </p:sp>
+      <p:sp>
+        <p:nvSpPr>
+          <p:cNvPr id="19" name="Rectangle 18">
+            <a:extLst>
+              <a:ext uri="{FF2B5EF4-FFF2-40B4-BE49-F238E27FC236}">
+                <a16:creationId xmlns:a16="http://schemas.microsoft.com/office/drawing/2014/main" id="{6443B922-C10E-0262-40C9-C3DA59BE051B}"/>
+              </a:ext>
+            </a:extLst>
+          </p:cNvPr>
+          <p:cNvSpPr/>
+          <p:nvPr/>
+        </p:nvSpPr>
+        <p:spPr>
+          <a:xfrm>
+            <a:off x="5128188" y="2017333"/>
+            <a:ext cx="245098" cy="3334037"/>
+          </a:xfrm>
+          <a:prstGeom prst="rect">
+            <a:avLst/>
+          </a:prstGeom>
+          <a:solidFill>
+            <a:srgbClr val="FFFF00">
+              <a:alpha val="36000"/>
+            </a:srgbClr>
+          </a:solidFill>
+          <a:ln w="6350">
+            <a:solidFill>
+              <a:schemeClr val="accent1">
+                <a:shade val="15000"/>
+              </a:schemeClr>
+            </a:solidFill>
+          </a:ln>
+        </p:spPr>
+        <p:style>
+          <a:lnRef idx="2">
+            <a:schemeClr val="accent1">
+              <a:shade val="15000"/>
+            </a:schemeClr>
+          </a:lnRef>
+          <a:fillRef idx="1">
+            <a:schemeClr val="accent1"/>
+          </a:fillRef>
+          <a:effectRef idx="0">
+            <a:schemeClr val="accent1"/>
+          </a:effectRef>
+          <a:fontRef idx="minor">
+            <a:schemeClr val="lt1"/>
+          </a:fontRef>
+        </p:style>
+        <p:txBody>
+          <a:bodyPr rtlCol="0" anchor="ctr"/>
+          <a:lstStyle/>
+          <a:p>
+            <a:pPr algn="ctr"/>
+            <a:endParaRPr lang="en-US"/>
+          </a:p>
+        </p:txBody>
+      </p:sp>
     </p:spTree>
     <p:extLst>
       <p:ext uri="{BB962C8B-B14F-4D97-AF65-F5344CB8AC3E}">
-        <p14:creationId xmlns:p14="http://schemas.microsoft.com/office/powerpoint/2010/main" val="1401741552"/>
+        <p14:creationId xmlns:p14="http://schemas.microsoft.com/office/powerpoint/2010/main" val="3183658329"/>
       </p:ext>
     </p:extLst>
   </p:cSld>
@@ -24699,15 +22807,6 @@
 </file>
 
 <file path=customXml/item2.xml><?xml version="1.0" encoding="utf-8"?>
-<?mso-contentType ?>
-<FormTemplates xmlns="http://schemas.microsoft.com/sharepoint/v3/contenttype/forms">
-  <Display>DocumentLibraryForm</Display>
-  <Edit>DocumentLibraryForm</Edit>
-  <New>DocumentLibraryForm</New>
-</FormTemplates>
-</file>
-
-<file path=customXml/item3.xml><?xml version="1.0" encoding="utf-8"?>
 <ct:contentTypeSchema xmlns:ct="http://schemas.microsoft.com/office/2006/metadata/contentType" xmlns:ma="http://schemas.microsoft.com/office/2006/metadata/properties/metaAttributes" ct:_="" ma:_="" ma:contentTypeName="Document" ma:contentTypeID="0x01010079F111ED35F8CC479449609E8A0923A6" ma:contentTypeVersion="11" ma:contentTypeDescription="Create a new document." ma:contentTypeScope="" ma:versionID="9677210f24a1be23c92c90fd886aa0aa">
   <xsd:schema xmlns:xsd="http://www.w3.org/2001/XMLSchema" xmlns:xs="http://www.w3.org/2001/XMLSchema" xmlns:p="http://schemas.microsoft.com/office/2006/metadata/properties" xmlns:ns2="71af3243-3dd4-4a8d-8c0d-dd76da1f02a5" xmlns:ns3="16c05727-aa75-4e4a-9b5f-8a80a1165891" targetNamespace="http://schemas.microsoft.com/office/2006/metadata/properties" ma:root="true" ma:fieldsID="60e05723c5c1908df1a1a4ebf11d344e" ns2:_="" ns3:_="">
     <xsd:import namespace="71af3243-3dd4-4a8d-8c0d-dd76da1f02a5"/>
@@ -24918,6 +23017,15 @@
 </ct:contentTypeSchema>
 </file>
 
+<file path=customXml/item3.xml><?xml version="1.0" encoding="utf-8"?>
+<?mso-contentType ?>
+<FormTemplates xmlns="http://schemas.microsoft.com/sharepoint/v3/contenttype/forms">
+  <Display>DocumentLibraryForm</Display>
+  <Edit>DocumentLibraryForm</Edit>
+  <New>DocumentLibraryForm</New>
+</FormTemplates>
+</file>
+
 <file path=customXml/itemProps1.xml><?xml version="1.0" encoding="utf-8"?>
 <ds:datastoreItem xmlns:ds="http://schemas.openxmlformats.org/officeDocument/2006/customXml" ds:itemID="{788A2F88-55C5-4ED1-9541-807C65424763}">
   <ds:schemaRefs>
@@ -24929,14 +23037,6 @@
 </file>
 
 <file path=customXml/itemProps2.xml><?xml version="1.0" encoding="utf-8"?>
-<ds:datastoreItem xmlns:ds="http://schemas.openxmlformats.org/officeDocument/2006/customXml" ds:itemID="{4F44C90D-2A62-4985-9618-3460247437B1}">
-  <ds:schemaRefs>
-    <ds:schemaRef ds:uri="http://schemas.microsoft.com/sharepoint/v3/contenttype/forms"/>
-  </ds:schemaRefs>
-</ds:datastoreItem>
-</file>
-
-<file path=customXml/itemProps3.xml><?xml version="1.0" encoding="utf-8"?>
 <ds:datastoreItem xmlns:ds="http://schemas.openxmlformats.org/officeDocument/2006/customXml" ds:itemID="{B61EAB5F-88FC-4FAE-AE3C-037A3C365EB8}">
   <ds:schemaRefs>
     <ds:schemaRef ds:uri="http://schemas.microsoft.com/office/2006/metadata/contentType"/>
@@ -24953,4 +23053,12 @@
     <ds:schemaRef ds:uri="http://schemas.microsoft.com/internal/obd"/>
   </ds:schemaRefs>
 </ds:datastoreItem>
+</file>
+
+<file path=customXml/itemProps3.xml><?xml version="1.0" encoding="utf-8"?>
+<ds:datastoreItem xmlns:ds="http://schemas.openxmlformats.org/officeDocument/2006/customXml" ds:itemID="{4F44C90D-2A62-4985-9618-3460247437B1}">
+  <ds:schemaRefs>
+    <ds:schemaRef ds:uri="http://schemas.microsoft.com/sharepoint/v3/contenttype/forms"/>
+  </ds:schemaRefs>
+</ds:datastoreItem>
 </file>
</xml_diff>